<commit_message>
Updated presentation charts to reflect updated application
</commit_message>
<xml_diff>
--- a/TowsonBook.pptx
+++ b/TowsonBook.pptx
@@ -5,7 +5,7 @@
     <p:sldMasterId id="2147483648" r:id="rId1"/>
   </p:sldMasterIdLst>
   <p:notesMasterIdLst>
-    <p:notesMasterId r:id="rId22"/>
+    <p:notesMasterId r:id="rId24"/>
   </p:notesMasterIdLst>
   <p:sldIdLst>
     <p:sldId id="256" r:id="rId2"/>
@@ -13,21 +13,23 @@
     <p:sldId id="257" r:id="rId4"/>
     <p:sldId id="258" r:id="rId5"/>
     <p:sldId id="261" r:id="rId6"/>
-    <p:sldId id="262" r:id="rId7"/>
-    <p:sldId id="263" r:id="rId8"/>
-    <p:sldId id="276" r:id="rId9"/>
-    <p:sldId id="267" r:id="rId10"/>
-    <p:sldId id="268" r:id="rId11"/>
-    <p:sldId id="270" r:id="rId12"/>
-    <p:sldId id="271" r:id="rId13"/>
-    <p:sldId id="272" r:id="rId14"/>
-    <p:sldId id="273" r:id="rId15"/>
-    <p:sldId id="274" r:id="rId16"/>
-    <p:sldId id="275" r:id="rId17"/>
-    <p:sldId id="266" r:id="rId18"/>
-    <p:sldId id="264" r:id="rId19"/>
-    <p:sldId id="269" r:id="rId20"/>
-    <p:sldId id="265" r:id="rId21"/>
+    <p:sldId id="277" r:id="rId7"/>
+    <p:sldId id="262" r:id="rId8"/>
+    <p:sldId id="263" r:id="rId9"/>
+    <p:sldId id="276" r:id="rId10"/>
+    <p:sldId id="267" r:id="rId11"/>
+    <p:sldId id="268" r:id="rId12"/>
+    <p:sldId id="270" r:id="rId13"/>
+    <p:sldId id="271" r:id="rId14"/>
+    <p:sldId id="272" r:id="rId15"/>
+    <p:sldId id="273" r:id="rId16"/>
+    <p:sldId id="278" r:id="rId17"/>
+    <p:sldId id="274" r:id="rId18"/>
+    <p:sldId id="275" r:id="rId19"/>
+    <p:sldId id="266" r:id="rId20"/>
+    <p:sldId id="264" r:id="rId21"/>
+    <p:sldId id="269" r:id="rId22"/>
+    <p:sldId id="265" r:id="rId23"/>
   </p:sldIdLst>
   <p:sldSz cx="12192000" cy="6858000"/>
   <p:notesSz cx="6858000" cy="9144000"/>
@@ -628,7 +630,7 @@
           <a:p>
             <a:fld id="{A8C095B2-1594-4E48-8B81-09F84C57DE32}" type="slidenum">
               <a:rPr lang="en-US" smtClean="0"/>
-              <a:t>7</a:t>
+              <a:t>8</a:t>
             </a:fld>
             <a:endParaRPr lang="en-US"/>
           </a:p>
@@ -712,7 +714,7 @@
           <a:p>
             <a:fld id="{A8C095B2-1594-4E48-8B81-09F84C57DE32}" type="slidenum">
               <a:rPr lang="en-US" smtClean="0"/>
-              <a:t>8</a:t>
+              <a:t>9</a:t>
             </a:fld>
             <a:endParaRPr lang="en-US"/>
           </a:p>
@@ -6554,7 +6556,7 @@
           <a:p>
             <a:r>
               <a:rPr lang="en-US" dirty="0" smtClean="0"/>
-              <a:t>External Resources</a:t>
+              <a:t>Applied Rails Features</a:t>
             </a:r>
             <a:endParaRPr lang="en-US" dirty="0"/>
           </a:p>
@@ -6572,8 +6574,8 @@
         </p:nvSpPr>
         <p:spPr>
           <a:xfrm>
-            <a:off x="677334" y="1643003"/>
-            <a:ext cx="8596668" cy="4516257"/>
+            <a:off x="677334" y="1654355"/>
+            <a:ext cx="8596668" cy="4110962"/>
           </a:xfrm>
         </p:spPr>
         <p:txBody>
@@ -6582,137 +6584,72 @@
           <a:p>
             <a:r>
               <a:rPr lang="en-US" dirty="0" smtClean="0"/>
-              <a:t>Devise- </a:t>
-            </a:r>
-            <a:r>
-              <a:rPr lang="en-US" dirty="0"/>
-              <a:t>It is a flexible authentication solution for Rails based on Warden. We </a:t>
-            </a:r>
-            <a:r>
-              <a:rPr lang="en-US" dirty="0" smtClean="0"/>
-              <a:t>used </a:t>
-            </a:r>
-            <a:r>
-              <a:rPr lang="en-US" dirty="0"/>
-              <a:t>the Devise Gem to generate the login screen and authenticate user login credentials and </a:t>
-            </a:r>
-            <a:r>
-              <a:rPr lang="en-US" dirty="0" smtClean="0"/>
-              <a:t>it also allows users </a:t>
-            </a:r>
-            <a:r>
-              <a:rPr lang="en-US" dirty="0"/>
-              <a:t>to sign up for the </a:t>
-            </a:r>
-            <a:r>
-              <a:rPr lang="en-US" dirty="0" err="1" smtClean="0"/>
-              <a:t>TowsonBook</a:t>
-            </a:r>
-            <a:r>
-              <a:rPr lang="en-US" dirty="0" smtClean="0"/>
-              <a:t> </a:t>
-            </a:r>
-            <a:r>
-              <a:rPr lang="en-US" dirty="0"/>
-              <a:t>app if they currently do not possess login credentials</a:t>
-            </a:r>
-            <a:r>
-              <a:rPr lang="en-US" dirty="0" smtClean="0"/>
-              <a:t>.</a:t>
-            </a:r>
-          </a:p>
-          <a:p>
+              <a:t>Gems</a:t>
+            </a:r>
+          </a:p>
+          <a:p>
+            <a:pPr lvl="1"/>
+            <a:r>
+              <a:rPr lang="en-US" dirty="0" smtClean="0"/>
+              <a:t>Devise</a:t>
+            </a:r>
+          </a:p>
+          <a:p>
+            <a:pPr lvl="1"/>
             <a:r>
               <a:rPr lang="en-US" dirty="0" err="1" smtClean="0"/>
               <a:t>Carrierwave</a:t>
             </a:r>
-            <a:r>
-              <a:rPr lang="en-US" dirty="0" smtClean="0"/>
-              <a:t>- </a:t>
-            </a:r>
-            <a:r>
-              <a:rPr lang="en-US" dirty="0"/>
-              <a:t>this </a:t>
-            </a:r>
-            <a:r>
-              <a:rPr lang="en-US" dirty="0" smtClean="0"/>
-              <a:t>handles file and photo </a:t>
-            </a:r>
-            <a:r>
-              <a:rPr lang="en-US" dirty="0"/>
-              <a:t>uploads on our </a:t>
-            </a:r>
-            <a:r>
-              <a:rPr lang="en-US" dirty="0" err="1" smtClean="0"/>
-              <a:t>TowsonBook</a:t>
-            </a:r>
-            <a:r>
-              <a:rPr lang="en-US" dirty="0" smtClean="0"/>
-              <a:t> </a:t>
-            </a:r>
-            <a:r>
-              <a:rPr lang="en-US" dirty="0"/>
-              <a:t>application.</a:t>
-            </a:r>
-          </a:p>
-          <a:p>
-            <a:r>
-              <a:rPr lang="en-US" dirty="0" smtClean="0"/>
-              <a:t>Twitter-bootstrap-rails- </a:t>
-            </a:r>
-            <a:r>
-              <a:rPr lang="en-US" dirty="0"/>
-              <a:t>Bootstrap is a toolkit from Twitter designed to </a:t>
-            </a:r>
-            <a:r>
-              <a:rPr lang="en-US" dirty="0" err="1"/>
-              <a:t>kickstart</a:t>
-            </a:r>
-            <a:r>
-              <a:rPr lang="en-US" dirty="0"/>
-              <a:t> development of </a:t>
-            </a:r>
-            <a:r>
-              <a:rPr lang="en-US" dirty="0" err="1"/>
-              <a:t>webapps</a:t>
-            </a:r>
-            <a:r>
-              <a:rPr lang="en-US" dirty="0"/>
-              <a:t> and sites. It includes base CSS and HTML for typography, forms, buttons, tables, grids, navigation, and more.</a:t>
-            </a:r>
             <a:endParaRPr lang="en-US" dirty="0" smtClean="0"/>
           </a:p>
           <a:p>
+            <a:pPr lvl="1"/>
+            <a:r>
+              <a:rPr lang="en-US" dirty="0" smtClean="0"/>
+              <a:t>Twitter-bootstrap-rails</a:t>
+            </a:r>
+          </a:p>
+          <a:p>
+            <a:pPr lvl="1"/>
             <a:r>
               <a:rPr lang="en-US" dirty="0" err="1" smtClean="0"/>
               <a:t>Sdoc</a:t>
             </a:r>
-            <a:r>
-              <a:rPr lang="en-US" dirty="0" smtClean="0"/>
-              <a:t>- </a:t>
-            </a:r>
-            <a:r>
-              <a:rPr lang="en-US" dirty="0"/>
-              <a:t>is an HTML template built on top of the </a:t>
-            </a:r>
-            <a:r>
-              <a:rPr lang="en-US" dirty="0" err="1"/>
-              <a:t>RDoc</a:t>
-            </a:r>
-            <a:r>
-              <a:rPr lang="en-US" dirty="0"/>
-              <a:t> documentation generator for Ruby code.</a:t>
-            </a:r>
-            <a:endParaRPr lang="en-US" dirty="0"/>
-          </a:p>
-          <a:p>
-            <a:endParaRPr lang="en-US" dirty="0"/>
-          </a:p>
-        </p:txBody>
-      </p:sp>
-      <p:sp>
-        <p:nvSpPr>
-          <p:cNvPr id="5" name="Slide Number Placeholder 4"/>
+            <a:endParaRPr lang="en-US" dirty="0" smtClean="0"/>
+          </a:p>
+          <a:p>
+            <a:pPr lvl="1"/>
+            <a:r>
+              <a:rPr lang="en-US" dirty="0" err="1" smtClean="0"/>
+              <a:t>Byebug</a:t>
+            </a:r>
+            <a:endParaRPr lang="en-US" dirty="0" smtClean="0"/>
+          </a:p>
+          <a:p>
+            <a:pPr lvl="1"/>
+            <a:r>
+              <a:rPr lang="en-US" dirty="0" smtClean="0"/>
+              <a:t>Web-console</a:t>
+            </a:r>
+          </a:p>
+          <a:p>
+            <a:r>
+              <a:rPr lang="en-US" dirty="0" smtClean="0"/>
+              <a:t>Session Handling</a:t>
+            </a:r>
+          </a:p>
+          <a:p>
+            <a:r>
+              <a:rPr lang="en-US" dirty="0" smtClean="0"/>
+              <a:t>Form Helpers</a:t>
+            </a:r>
+            <a:endParaRPr lang="en-US" dirty="0"/>
+          </a:p>
+        </p:txBody>
+      </p:sp>
+      <p:sp>
+        <p:nvSpPr>
+          <p:cNvPr id="4" name="Slide Number Placeholder 3"/>
           <p:cNvSpPr>
             <a:spLocks noGrp="1"/>
           </p:cNvSpPr>
@@ -6736,7 +6673,7 @@
     </p:spTree>
     <p:extLst>
       <p:ext uri="{BB962C8B-B14F-4D97-AF65-F5344CB8AC3E}">
-        <p14:creationId xmlns:p14="http://schemas.microsoft.com/office/powerpoint/2010/main" val="3080036090"/>
+        <p14:creationId xmlns:p14="http://schemas.microsoft.com/office/powerpoint/2010/main" val="2432371481"/>
       </p:ext>
     </p:extLst>
   </p:cSld>
@@ -6780,38 +6717,217 @@
           <a:p>
             <a:r>
               <a:rPr lang="en-US" dirty="0" smtClean="0"/>
-              <a:t>Welcome Splash Page</a:t>
-            </a:r>
-            <a:endParaRPr lang="en-US" dirty="0"/>
-          </a:p>
-        </p:txBody>
-      </p:sp>
-      <p:pic>
-        <p:nvPicPr>
-          <p:cNvPr id="4" name="Content Placeholder 3"/>
-          <p:cNvPicPr>
-            <a:picLocks noGrp="1" noChangeAspect="1"/>
-          </p:cNvPicPr>
+              <a:t>External Resources</a:t>
+            </a:r>
+            <a:endParaRPr lang="en-US" dirty="0"/>
+          </a:p>
+        </p:txBody>
+      </p:sp>
+      <p:sp>
+        <p:nvSpPr>
+          <p:cNvPr id="3" name="Content Placeholder 2"/>
+          <p:cNvSpPr>
+            <a:spLocks noGrp="1"/>
+          </p:cNvSpPr>
           <p:nvPr>
             <p:ph idx="1"/>
           </p:nvPr>
-        </p:nvPicPr>
-        <p:blipFill>
-          <a:blip r:embed="rId2"/>
-          <a:stretch>
-            <a:fillRect/>
-          </a:stretch>
-        </p:blipFill>
+        </p:nvSpPr>
         <p:spPr>
           <a:xfrm>
-            <a:off x="677863" y="2309391"/>
-            <a:ext cx="8596312" cy="4031023"/>
+            <a:off x="677334" y="1643003"/>
+            <a:ext cx="8596668" cy="4516257"/>
           </a:xfrm>
-          <a:prstGeom prst="rect">
-            <a:avLst/>
-          </a:prstGeom>
         </p:spPr>
-      </p:pic>
+        <p:txBody>
+          <a:bodyPr>
+            <a:normAutofit fontScale="92500" lnSpcReduction="10000"/>
+          </a:bodyPr>
+          <a:lstStyle/>
+          <a:p>
+            <a:r>
+              <a:rPr lang="en-US" dirty="0" smtClean="0"/>
+              <a:t>Devise- </a:t>
+            </a:r>
+            <a:r>
+              <a:rPr lang="en-US" dirty="0"/>
+              <a:t>It is a flexible authentication solution for Rails based on Warden. We </a:t>
+            </a:r>
+            <a:r>
+              <a:rPr lang="en-US" dirty="0" smtClean="0"/>
+              <a:t>used </a:t>
+            </a:r>
+            <a:r>
+              <a:rPr lang="en-US" dirty="0"/>
+              <a:t>the Devise Gem to generate the login screen and authenticate user login credentials and </a:t>
+            </a:r>
+            <a:r>
+              <a:rPr lang="en-US" dirty="0" smtClean="0"/>
+              <a:t>it also allows users </a:t>
+            </a:r>
+            <a:r>
+              <a:rPr lang="en-US" dirty="0"/>
+              <a:t>to sign up for the </a:t>
+            </a:r>
+            <a:r>
+              <a:rPr lang="en-US" dirty="0" err="1" smtClean="0"/>
+              <a:t>TowsonBook</a:t>
+            </a:r>
+            <a:r>
+              <a:rPr lang="en-US" dirty="0" smtClean="0"/>
+              <a:t> </a:t>
+            </a:r>
+            <a:r>
+              <a:rPr lang="en-US" dirty="0"/>
+              <a:t>app if they currently do not possess login credentials</a:t>
+            </a:r>
+            <a:r>
+              <a:rPr lang="en-US" dirty="0" smtClean="0"/>
+              <a:t>.</a:t>
+            </a:r>
+          </a:p>
+          <a:p>
+            <a:r>
+              <a:rPr lang="en-US" dirty="0" err="1" smtClean="0"/>
+              <a:t>Carrierwave</a:t>
+            </a:r>
+            <a:r>
+              <a:rPr lang="en-US" dirty="0" smtClean="0"/>
+              <a:t>- </a:t>
+            </a:r>
+            <a:r>
+              <a:rPr lang="en-US" dirty="0"/>
+              <a:t>this </a:t>
+            </a:r>
+            <a:r>
+              <a:rPr lang="en-US" dirty="0" smtClean="0"/>
+              <a:t>handles file and photo </a:t>
+            </a:r>
+            <a:r>
+              <a:rPr lang="en-US" dirty="0"/>
+              <a:t>uploads on our </a:t>
+            </a:r>
+            <a:r>
+              <a:rPr lang="en-US" dirty="0" err="1" smtClean="0"/>
+              <a:t>TowsonBook</a:t>
+            </a:r>
+            <a:r>
+              <a:rPr lang="en-US" dirty="0" smtClean="0"/>
+              <a:t> </a:t>
+            </a:r>
+            <a:r>
+              <a:rPr lang="en-US" dirty="0"/>
+              <a:t>application.</a:t>
+            </a:r>
+          </a:p>
+          <a:p>
+            <a:r>
+              <a:rPr lang="en-US" dirty="0" smtClean="0"/>
+              <a:t>Twitter-bootstrap-rails- </a:t>
+            </a:r>
+            <a:r>
+              <a:rPr lang="en-US" dirty="0"/>
+              <a:t>Bootstrap is a toolkit from Twitter designed to </a:t>
+            </a:r>
+            <a:r>
+              <a:rPr lang="en-US" dirty="0" err="1"/>
+              <a:t>kickstart</a:t>
+            </a:r>
+            <a:r>
+              <a:rPr lang="en-US" dirty="0"/>
+              <a:t> development of </a:t>
+            </a:r>
+            <a:r>
+              <a:rPr lang="en-US" dirty="0" err="1"/>
+              <a:t>webapps</a:t>
+            </a:r>
+            <a:r>
+              <a:rPr lang="en-US" dirty="0"/>
+              <a:t> and sites. It includes base CSS and HTML for typography, forms, buttons, tables, grids, navigation, and more.</a:t>
+            </a:r>
+            <a:endParaRPr lang="en-US" dirty="0" smtClean="0"/>
+          </a:p>
+          <a:p>
+            <a:r>
+              <a:rPr lang="en-US" dirty="0" err="1" smtClean="0"/>
+              <a:t>Sdoc</a:t>
+            </a:r>
+            <a:r>
+              <a:rPr lang="en-US" dirty="0" smtClean="0"/>
+              <a:t>- </a:t>
+            </a:r>
+            <a:r>
+              <a:rPr lang="en-US" dirty="0"/>
+              <a:t>is an HTML template built on top of the </a:t>
+            </a:r>
+            <a:r>
+              <a:rPr lang="en-US" dirty="0" err="1"/>
+              <a:t>RDoc</a:t>
+            </a:r>
+            <a:r>
+              <a:rPr lang="en-US" dirty="0"/>
+              <a:t> documentation generator for Ruby code</a:t>
+            </a:r>
+            <a:r>
+              <a:rPr lang="en-US" dirty="0" smtClean="0"/>
+              <a:t>.</a:t>
+            </a:r>
+          </a:p>
+          <a:p>
+            <a:r>
+              <a:rPr lang="en-US" dirty="0" smtClean="0"/>
+              <a:t>Bye bug- is a debugger that stops execution and open up the debugger console that </a:t>
+            </a:r>
+            <a:r>
+              <a:rPr lang="en-US" dirty="0"/>
+              <a:t>allows you to see what is going on </a:t>
+            </a:r>
+            <a:r>
+              <a:rPr lang="en-US" i="1" dirty="0"/>
+              <a:t>inside</a:t>
+            </a:r>
+            <a:r>
+              <a:rPr lang="en-US" dirty="0"/>
+              <a:t> a Ruby program while it executes </a:t>
+            </a:r>
+            <a:endParaRPr lang="en-US" dirty="0" smtClean="0"/>
+          </a:p>
+          <a:p>
+            <a:r>
+              <a:rPr lang="en-US" dirty="0" smtClean="0"/>
+              <a:t>Web console- </a:t>
+            </a:r>
+            <a:r>
+              <a:rPr lang="en-US" i="1" dirty="0"/>
+              <a:t>Web Console</a:t>
+            </a:r>
+            <a:r>
+              <a:rPr lang="en-US" dirty="0"/>
+              <a:t> is a debugging tool for your Ruby on Rails </a:t>
+            </a:r>
+            <a:r>
+              <a:rPr lang="en-US" dirty="0" smtClean="0"/>
+              <a:t>applications that </a:t>
+            </a:r>
+            <a:r>
+              <a:rPr lang="en-US" dirty="0"/>
+              <a:t>allows you to execute arbitrary code on the </a:t>
+            </a:r>
+            <a:r>
+              <a:rPr lang="en-US" dirty="0" smtClean="0"/>
+              <a:t>server through </a:t>
+            </a:r>
+            <a:r>
+              <a:rPr lang="en-US" dirty="0"/>
+              <a:t>an interactive Ruby session in your browser</a:t>
+            </a:r>
+            <a:endParaRPr lang="en-US" dirty="0"/>
+          </a:p>
+          <a:p>
+            <a:endParaRPr lang="en-US" dirty="0"/>
+          </a:p>
+        </p:txBody>
+      </p:sp>
       <p:sp>
         <p:nvSpPr>
           <p:cNvPr id="5" name="Slide Number Placeholder 4"/>
@@ -6838,7 +6954,7 @@
     </p:spTree>
     <p:extLst>
       <p:ext uri="{BB962C8B-B14F-4D97-AF65-F5344CB8AC3E}">
-        <p14:creationId xmlns:p14="http://schemas.microsoft.com/office/powerpoint/2010/main" val="453211882"/>
+        <p14:creationId xmlns:p14="http://schemas.microsoft.com/office/powerpoint/2010/main" val="3080036090"/>
       </p:ext>
     </p:extLst>
   </p:cSld>
@@ -6882,15 +6998,38 @@
           <a:p>
             <a:r>
               <a:rPr lang="en-US" dirty="0" smtClean="0"/>
-              <a:t>Main Login</a:t>
-            </a:r>
+              <a:t>Welcome Splash Page</a:t>
+            </a:r>
+            <a:endParaRPr lang="en-US" dirty="0"/>
+          </a:p>
+        </p:txBody>
+      </p:sp>
+      <p:sp>
+        <p:nvSpPr>
+          <p:cNvPr id="5" name="Slide Number Placeholder 4"/>
+          <p:cNvSpPr>
+            <a:spLocks noGrp="1"/>
+          </p:cNvSpPr>
+          <p:nvPr>
+            <p:ph type="sldNum" sz="quarter" idx="12"/>
+          </p:nvPr>
+        </p:nvSpPr>
+        <p:spPr/>
+        <p:txBody>
+          <a:bodyPr/>
+          <a:lstStyle/>
+          <a:p>
+            <a:fld id="{519954A3-9DFD-4C44-94BA-B95130A3BA1C}" type="slidenum">
+              <a:rPr lang="en-US" smtClean="0"/>
+              <a:t>12</a:t>
+            </a:fld>
             <a:endParaRPr lang="en-US" dirty="0"/>
           </a:p>
         </p:txBody>
       </p:sp>
       <p:pic>
         <p:nvPicPr>
-          <p:cNvPr id="4" name="Content Placeholder 3"/>
+          <p:cNvPr id="8" name="Content Placeholder 7"/>
           <p:cNvPicPr>
             <a:picLocks noGrp="1" noChangeAspect="1"/>
           </p:cNvPicPr>
@@ -6906,41 +7045,18 @@
         </p:blipFill>
         <p:spPr>
           <a:xfrm>
-            <a:off x="677334" y="1539177"/>
-            <a:ext cx="8895588" cy="4464808"/>
+            <a:off x="407601" y="1426005"/>
+            <a:ext cx="9136133" cy="4616473"/>
           </a:xfrm>
           <a:prstGeom prst="rect">
             <a:avLst/>
           </a:prstGeom>
         </p:spPr>
       </p:pic>
-      <p:sp>
-        <p:nvSpPr>
-          <p:cNvPr id="5" name="Slide Number Placeholder 4"/>
-          <p:cNvSpPr>
-            <a:spLocks noGrp="1"/>
-          </p:cNvSpPr>
-          <p:nvPr>
-            <p:ph type="sldNum" sz="quarter" idx="12"/>
-          </p:nvPr>
-        </p:nvSpPr>
-        <p:spPr/>
-        <p:txBody>
-          <a:bodyPr/>
-          <a:lstStyle/>
-          <a:p>
-            <a:fld id="{519954A3-9DFD-4C44-94BA-B95130A3BA1C}" type="slidenum">
-              <a:rPr lang="en-US" smtClean="0"/>
-              <a:t>12</a:t>
-            </a:fld>
-            <a:endParaRPr lang="en-US" dirty="0"/>
-          </a:p>
-        </p:txBody>
-      </p:sp>
     </p:spTree>
     <p:extLst>
       <p:ext uri="{BB962C8B-B14F-4D97-AF65-F5344CB8AC3E}">
-        <p14:creationId xmlns:p14="http://schemas.microsoft.com/office/powerpoint/2010/main" val="1592974824"/>
+        <p14:creationId xmlns:p14="http://schemas.microsoft.com/office/powerpoint/2010/main" val="453211882"/>
       </p:ext>
     </p:extLst>
   </p:cSld>
@@ -6984,7 +7100,7 @@
           <a:p>
             <a:r>
               <a:rPr lang="en-US" dirty="0" smtClean="0"/>
-              <a:t>Friendships</a:t>
+              <a:t>Main Login</a:t>
             </a:r>
             <a:endParaRPr lang="en-US" dirty="0"/>
           </a:p>
@@ -7008,8 +7124,8 @@
         </p:blipFill>
         <p:spPr>
           <a:xfrm>
-            <a:off x="677863" y="2169042"/>
-            <a:ext cx="8596312" cy="3864528"/>
+            <a:off x="677334" y="1539177"/>
+            <a:ext cx="8895588" cy="4464808"/>
           </a:xfrm>
           <a:prstGeom prst="rect">
             <a:avLst/>
@@ -7042,7 +7158,7 @@
     </p:spTree>
     <p:extLst>
       <p:ext uri="{BB962C8B-B14F-4D97-AF65-F5344CB8AC3E}">
-        <p14:creationId xmlns:p14="http://schemas.microsoft.com/office/powerpoint/2010/main" val="2797261881"/>
+        <p14:creationId xmlns:p14="http://schemas.microsoft.com/office/powerpoint/2010/main" val="1592974824"/>
       </p:ext>
     </p:extLst>
   </p:cSld>
@@ -7086,7 +7202,7 @@
           <a:p>
             <a:r>
               <a:rPr lang="en-US" dirty="0" smtClean="0"/>
-              <a:t>User’s Profile Page</a:t>
+              <a:t>Friendships</a:t>
             </a:r>
             <a:endParaRPr lang="en-US" dirty="0"/>
           </a:p>
@@ -7094,7 +7210,7 @@
       </p:sp>
       <p:pic>
         <p:nvPicPr>
-          <p:cNvPr id="6" name="Content Placeholder 5"/>
+          <p:cNvPr id="4" name="Content Placeholder 3"/>
           <p:cNvPicPr>
             <a:picLocks noGrp="1" noChangeAspect="1"/>
           </p:cNvPicPr>
@@ -7110,8 +7226,8 @@
         </p:blipFill>
         <p:spPr>
           <a:xfrm>
-            <a:off x="677334" y="1507705"/>
-            <a:ext cx="8394134" cy="4530786"/>
+            <a:off x="677863" y="2169042"/>
+            <a:ext cx="8596312" cy="3864528"/>
           </a:xfrm>
           <a:prstGeom prst="rect">
             <a:avLst/>
@@ -7120,7 +7236,7 @@
       </p:pic>
       <p:sp>
         <p:nvSpPr>
-          <p:cNvPr id="7" name="Slide Number Placeholder 6"/>
+          <p:cNvPr id="5" name="Slide Number Placeholder 4"/>
           <p:cNvSpPr>
             <a:spLocks noGrp="1"/>
           </p:cNvSpPr>
@@ -7144,7 +7260,7 @@
     </p:spTree>
     <p:extLst>
       <p:ext uri="{BB962C8B-B14F-4D97-AF65-F5344CB8AC3E}">
-        <p14:creationId xmlns:p14="http://schemas.microsoft.com/office/powerpoint/2010/main" val="1292289192"/>
+        <p14:creationId xmlns:p14="http://schemas.microsoft.com/office/powerpoint/2010/main" val="2797261881"/>
       </p:ext>
     </p:extLst>
   </p:cSld>
@@ -7188,15 +7304,38 @@
           <a:p>
             <a:r>
               <a:rPr lang="en-US" dirty="0" smtClean="0"/>
-              <a:t>Manage Groups</a:t>
-            </a:r>
+              <a:t>User’s Profile Page</a:t>
+            </a:r>
+            <a:endParaRPr lang="en-US" dirty="0"/>
+          </a:p>
+        </p:txBody>
+      </p:sp>
+      <p:sp>
+        <p:nvSpPr>
+          <p:cNvPr id="7" name="Slide Number Placeholder 6"/>
+          <p:cNvSpPr>
+            <a:spLocks noGrp="1"/>
+          </p:cNvSpPr>
+          <p:nvPr>
+            <p:ph type="sldNum" sz="quarter" idx="12"/>
+          </p:nvPr>
+        </p:nvSpPr>
+        <p:spPr/>
+        <p:txBody>
+          <a:bodyPr/>
+          <a:lstStyle/>
+          <a:p>
+            <a:fld id="{519954A3-9DFD-4C44-94BA-B95130A3BA1C}" type="slidenum">
+              <a:rPr lang="en-US" smtClean="0"/>
+              <a:t>15</a:t>
+            </a:fld>
             <a:endParaRPr lang="en-US" dirty="0"/>
           </a:p>
         </p:txBody>
       </p:sp>
       <p:pic>
         <p:nvPicPr>
-          <p:cNvPr id="4" name="Content Placeholder 3"/>
+          <p:cNvPr id="10" name="Content Placeholder 9"/>
           <p:cNvPicPr>
             <a:picLocks noGrp="1" noChangeAspect="1"/>
           </p:cNvPicPr>
@@ -7212,41 +7351,18 @@
         </p:blipFill>
         <p:spPr>
           <a:xfrm>
-            <a:off x="677863" y="2352822"/>
-            <a:ext cx="8596312" cy="3496969"/>
+            <a:off x="414163" y="1366576"/>
+            <a:ext cx="8883334" cy="4943789"/>
           </a:xfrm>
           <a:prstGeom prst="rect">
             <a:avLst/>
           </a:prstGeom>
         </p:spPr>
       </p:pic>
-      <p:sp>
-        <p:nvSpPr>
-          <p:cNvPr id="5" name="Slide Number Placeholder 4"/>
-          <p:cNvSpPr>
-            <a:spLocks noGrp="1"/>
-          </p:cNvSpPr>
-          <p:nvPr>
-            <p:ph type="sldNum" sz="quarter" idx="12"/>
-          </p:nvPr>
-        </p:nvSpPr>
-        <p:spPr/>
-        <p:txBody>
-          <a:bodyPr/>
-          <a:lstStyle/>
-          <a:p>
-            <a:fld id="{519954A3-9DFD-4C44-94BA-B95130A3BA1C}" type="slidenum">
-              <a:rPr lang="en-US" smtClean="0"/>
-              <a:t>15</a:t>
-            </a:fld>
-            <a:endParaRPr lang="en-US" dirty="0"/>
-          </a:p>
-        </p:txBody>
-      </p:sp>
     </p:spTree>
     <p:extLst>
       <p:ext uri="{BB962C8B-B14F-4D97-AF65-F5344CB8AC3E}">
-        <p14:creationId xmlns:p14="http://schemas.microsoft.com/office/powerpoint/2010/main" val="3343831592"/>
+        <p14:creationId xmlns:p14="http://schemas.microsoft.com/office/powerpoint/2010/main" val="1292289192"/>
       </p:ext>
     </p:extLst>
   </p:cSld>
@@ -7290,7 +7406,7 @@
           <a:p>
             <a:r>
               <a:rPr lang="en-US" dirty="0" smtClean="0"/>
-              <a:t>Sign-Out/Logout</a:t>
+              <a:t>Editing a Profile</a:t>
             </a:r>
             <a:endParaRPr lang="en-US" dirty="0"/>
           </a:p>
@@ -7298,7 +7414,7 @@
       </p:sp>
       <p:pic>
         <p:nvPicPr>
-          <p:cNvPr id="4" name="Content Placeholder 3"/>
+          <p:cNvPr id="5" name="Content Placeholder 4"/>
           <p:cNvPicPr>
             <a:picLocks noGrp="1" noChangeAspect="1"/>
           </p:cNvPicPr>
@@ -7314,8 +7430,8 @@
         </p:blipFill>
         <p:spPr>
           <a:xfrm>
-            <a:off x="874932" y="1499080"/>
-            <a:ext cx="8977431" cy="4349629"/>
+            <a:off x="984738" y="1999232"/>
+            <a:ext cx="7676189" cy="4042793"/>
           </a:xfrm>
           <a:prstGeom prst="rect">
             <a:avLst/>
@@ -7324,7 +7440,7 @@
       </p:pic>
       <p:sp>
         <p:nvSpPr>
-          <p:cNvPr id="5" name="Slide Number Placeholder 4"/>
+          <p:cNvPr id="4" name="Slide Number Placeholder 3"/>
           <p:cNvSpPr>
             <a:spLocks noGrp="1"/>
           </p:cNvSpPr>
@@ -7348,7 +7464,7 @@
     </p:spTree>
     <p:extLst>
       <p:ext uri="{BB962C8B-B14F-4D97-AF65-F5344CB8AC3E}">
-        <p14:creationId xmlns:p14="http://schemas.microsoft.com/office/powerpoint/2010/main" val="1460339544"/>
+        <p14:creationId xmlns:p14="http://schemas.microsoft.com/office/powerpoint/2010/main" val="3295031821"/>
       </p:ext>
     </p:extLst>
   </p:cSld>
@@ -7392,44 +7508,15 @@
           <a:p>
             <a:r>
               <a:rPr lang="en-US" dirty="0" smtClean="0"/>
-              <a:t>Demo</a:t>
-            </a:r>
-            <a:endParaRPr lang="en-US" dirty="0"/>
-          </a:p>
-        </p:txBody>
-      </p:sp>
-      <p:sp>
-        <p:nvSpPr>
-          <p:cNvPr id="3" name="Content Placeholder 2"/>
-          <p:cNvSpPr>
-            <a:spLocks noGrp="1"/>
-          </p:cNvSpPr>
-          <p:nvPr>
-            <p:ph idx="1"/>
-          </p:nvPr>
-        </p:nvSpPr>
-        <p:spPr/>
-        <p:txBody>
-          <a:bodyPr/>
-          <a:lstStyle/>
-          <a:p>
-            <a:r>
-              <a:rPr lang="en-US" dirty="0" smtClean="0"/>
-              <a:t>Demonstrated By: Jose </a:t>
-            </a:r>
-          </a:p>
-          <a:p>
-            <a:r>
-              <a:rPr lang="en-US" dirty="0" smtClean="0"/>
-              <a:t>Explained By: Robert and Pandora</a:t>
-            </a:r>
-            <a:endParaRPr lang="en-US" dirty="0"/>
-          </a:p>
-        </p:txBody>
-      </p:sp>
-      <p:sp>
-        <p:nvSpPr>
-          <p:cNvPr id="4" name="Slide Number Placeholder 3"/>
+              <a:t>Manage Groups</a:t>
+            </a:r>
+            <a:endParaRPr lang="en-US" dirty="0"/>
+          </a:p>
+        </p:txBody>
+      </p:sp>
+      <p:sp>
+        <p:nvSpPr>
+          <p:cNvPr id="5" name="Slide Number Placeholder 4"/>
           <p:cNvSpPr>
             <a:spLocks noGrp="1"/>
           </p:cNvSpPr>
@@ -7450,10 +7537,36 @@
           </a:p>
         </p:txBody>
       </p:sp>
+      <p:pic>
+        <p:nvPicPr>
+          <p:cNvPr id="8" name="Content Placeholder 7"/>
+          <p:cNvPicPr>
+            <a:picLocks noGrp="1" noChangeAspect="1"/>
+          </p:cNvPicPr>
+          <p:nvPr>
+            <p:ph idx="1"/>
+          </p:nvPr>
+        </p:nvPicPr>
+        <p:blipFill>
+          <a:blip r:embed="rId2"/>
+          <a:stretch>
+            <a:fillRect/>
+          </a:stretch>
+        </p:blipFill>
+        <p:spPr>
+          <a:xfrm>
+            <a:off x="318560" y="1211140"/>
+            <a:ext cx="8955442" cy="5119782"/>
+          </a:xfrm>
+          <a:prstGeom prst="rect">
+            <a:avLst/>
+          </a:prstGeom>
+        </p:spPr>
+      </p:pic>
     </p:spTree>
     <p:extLst>
       <p:ext uri="{BB962C8B-B14F-4D97-AF65-F5344CB8AC3E}">
-        <p14:creationId xmlns:p14="http://schemas.microsoft.com/office/powerpoint/2010/main" val="3429959256"/>
+        <p14:creationId xmlns:p14="http://schemas.microsoft.com/office/powerpoint/2010/main" val="3343831592"/>
       </p:ext>
     </p:extLst>
   </p:cSld>
@@ -7497,38 +7610,15 @@
           <a:p>
             <a:r>
               <a:rPr lang="en-US" dirty="0" smtClean="0"/>
-              <a:t>Lessons Learned</a:t>
-            </a:r>
-            <a:endParaRPr lang="en-US" dirty="0"/>
-          </a:p>
-        </p:txBody>
-      </p:sp>
-      <p:sp>
-        <p:nvSpPr>
-          <p:cNvPr id="3" name="Content Placeholder 2"/>
-          <p:cNvSpPr>
-            <a:spLocks noGrp="1"/>
-          </p:cNvSpPr>
-          <p:nvPr>
-            <p:ph idx="1"/>
-          </p:nvPr>
-        </p:nvSpPr>
-        <p:spPr/>
-        <p:txBody>
-          <a:bodyPr/>
-          <a:lstStyle/>
-          <a:p>
-            <a:r>
-              <a:rPr lang="en-US" dirty="0" smtClean="0"/>
-              <a:t>Value in having an online configuration management tool</a:t>
-            </a:r>
-            <a:endParaRPr lang="en-US" dirty="0"/>
-          </a:p>
-        </p:txBody>
-      </p:sp>
-      <p:sp>
-        <p:nvSpPr>
-          <p:cNvPr id="4" name="Slide Number Placeholder 3"/>
+              <a:t>Sign-Out/Logout</a:t>
+            </a:r>
+            <a:endParaRPr lang="en-US" dirty="0"/>
+          </a:p>
+        </p:txBody>
+      </p:sp>
+      <p:sp>
+        <p:nvSpPr>
+          <p:cNvPr id="5" name="Slide Number Placeholder 4"/>
           <p:cNvSpPr>
             <a:spLocks noGrp="1"/>
           </p:cNvSpPr>
@@ -7549,10 +7639,36 @@
           </a:p>
         </p:txBody>
       </p:sp>
+      <p:pic>
+        <p:nvPicPr>
+          <p:cNvPr id="7" name="Content Placeholder 6"/>
+          <p:cNvPicPr>
+            <a:picLocks noGrp="1" noChangeAspect="1"/>
+          </p:cNvPicPr>
+          <p:nvPr>
+            <p:ph idx="1"/>
+          </p:nvPr>
+        </p:nvPicPr>
+        <p:blipFill>
+          <a:blip r:embed="rId2"/>
+          <a:stretch>
+            <a:fillRect/>
+          </a:stretch>
+        </p:blipFill>
+        <p:spPr>
+          <a:xfrm>
+            <a:off x="700438" y="1543050"/>
+            <a:ext cx="8900762" cy="4667250"/>
+          </a:xfrm>
+          <a:prstGeom prst="rect">
+            <a:avLst/>
+          </a:prstGeom>
+        </p:spPr>
+      </p:pic>
     </p:spTree>
     <p:extLst>
       <p:ext uri="{BB962C8B-B14F-4D97-AF65-F5344CB8AC3E}">
-        <p14:creationId xmlns:p14="http://schemas.microsoft.com/office/powerpoint/2010/main" val="2437011028"/>
+        <p14:creationId xmlns:p14="http://schemas.microsoft.com/office/powerpoint/2010/main" val="1460339544"/>
       </p:ext>
     </p:extLst>
   </p:cSld>
@@ -7596,162 +7712,44 @@
           <a:p>
             <a:r>
               <a:rPr lang="en-US" dirty="0" smtClean="0"/>
-              <a:t>Responsibilities: Who Did What</a:t>
-            </a:r>
-            <a:endParaRPr lang="en-US" dirty="0"/>
-          </a:p>
-        </p:txBody>
-      </p:sp>
-      <p:sp>
-        <p:nvSpPr>
-          <p:cNvPr id="10" name="Content Placeholder 9"/>
-          <p:cNvSpPr>
-            <a:spLocks noGrp="1"/>
-          </p:cNvSpPr>
-          <p:nvPr>
-            <p:ph sz="half" idx="1"/>
-          </p:nvPr>
-        </p:nvSpPr>
-        <p:spPr>
-          <a:xfrm>
-            <a:off x="677334" y="1487729"/>
-            <a:ext cx="4184035" cy="3880772"/>
-          </a:xfrm>
-        </p:spPr>
-        <p:txBody>
-          <a:bodyPr/>
-          <a:lstStyle/>
-          <a:p>
-            <a:r>
-              <a:rPr lang="en-US" b="1" dirty="0" smtClean="0"/>
-              <a:t>Robert </a:t>
-            </a:r>
-            <a:r>
-              <a:rPr lang="en-US" b="1" dirty="0" err="1" smtClean="0"/>
-              <a:t>Bathmann</a:t>
-            </a:r>
-            <a:endParaRPr lang="en-US" b="1" dirty="0" smtClean="0"/>
-          </a:p>
-          <a:p>
-            <a:pPr lvl="1"/>
-            <a:r>
-              <a:rPr lang="en-US" dirty="0" smtClean="0"/>
-              <a:t>Project Creation</a:t>
-            </a:r>
-          </a:p>
-          <a:p>
-            <a:pPr lvl="1"/>
-            <a:r>
-              <a:rPr lang="en-US" dirty="0" smtClean="0"/>
-              <a:t>Friendship model</a:t>
-            </a:r>
-          </a:p>
-          <a:p>
-            <a:pPr lvl="1"/>
-            <a:r>
-              <a:rPr lang="en-US" dirty="0" smtClean="0"/>
-              <a:t>Adding Users to Groups</a:t>
-            </a:r>
-          </a:p>
-          <a:p>
-            <a:endParaRPr lang="en-US" dirty="0" smtClean="0"/>
-          </a:p>
-          <a:p>
-            <a:r>
-              <a:rPr lang="en-US" b="1" dirty="0" err="1" smtClean="0"/>
-              <a:t>Jlaja</a:t>
-            </a:r>
-            <a:r>
-              <a:rPr lang="en-US" b="1" dirty="0" smtClean="0"/>
-              <a:t> Pandora Podier</a:t>
-            </a:r>
-          </a:p>
-          <a:p>
-            <a:pPr lvl="1"/>
-            <a:r>
-              <a:rPr lang="en-US" dirty="0" smtClean="0"/>
-              <a:t>Established GitHub Repository</a:t>
-            </a:r>
-          </a:p>
-          <a:p>
-            <a:pPr lvl="1"/>
-            <a:r>
-              <a:rPr lang="en-US" dirty="0" smtClean="0"/>
-              <a:t>User </a:t>
-            </a:r>
-            <a:r>
-              <a:rPr lang="en-US" dirty="0"/>
-              <a:t>Login (Facebook Authentication Login</a:t>
-            </a:r>
-            <a:r>
-              <a:rPr lang="en-US" dirty="0" smtClean="0"/>
-              <a:t>)</a:t>
-            </a:r>
-          </a:p>
-          <a:p>
-            <a:pPr lvl="1"/>
-            <a:r>
-              <a:rPr lang="en-US" dirty="0" smtClean="0"/>
-              <a:t>Wall Post</a:t>
-            </a:r>
-            <a:endParaRPr lang="en-US" dirty="0"/>
-          </a:p>
-          <a:p>
-            <a:pPr lvl="1"/>
-            <a:endParaRPr lang="en-US" dirty="0"/>
-          </a:p>
-        </p:txBody>
-      </p:sp>
-      <p:sp>
-        <p:nvSpPr>
-          <p:cNvPr id="11" name="Content Placeholder 10"/>
-          <p:cNvSpPr>
-            <a:spLocks noGrp="1"/>
-          </p:cNvSpPr>
-          <p:nvPr>
-            <p:ph sz="half" idx="2"/>
-          </p:nvPr>
-        </p:nvSpPr>
-        <p:spPr>
-          <a:xfrm>
-            <a:off x="5089968" y="1487729"/>
-            <a:ext cx="4184034" cy="3880773"/>
-          </a:xfrm>
-        </p:spPr>
-        <p:txBody>
-          <a:bodyPr/>
-          <a:lstStyle/>
-          <a:p>
-            <a:r>
-              <a:rPr lang="en-US" b="1" dirty="0" smtClean="0"/>
-              <a:t>Jose </a:t>
-            </a:r>
-            <a:r>
-              <a:rPr lang="en-US" b="1" dirty="0" err="1" smtClean="0"/>
-              <a:t>Quinchuela</a:t>
-            </a:r>
-            <a:endParaRPr lang="en-US" b="1" dirty="0" smtClean="0"/>
-          </a:p>
-          <a:p>
-            <a:pPr lvl="1"/>
-            <a:r>
-              <a:rPr lang="en-US" dirty="0" smtClean="0"/>
-              <a:t>File/Photo Upload</a:t>
-            </a:r>
-          </a:p>
-          <a:p>
-            <a:pPr lvl="1"/>
-            <a:r>
-              <a:rPr lang="en-US" dirty="0" smtClean="0"/>
-              <a:t>Search for Users</a:t>
-            </a:r>
-            <a:endParaRPr lang="en-US" dirty="0"/>
-          </a:p>
-        </p:txBody>
-      </p:sp>
-      <p:sp>
-        <p:nvSpPr>
-          <p:cNvPr id="12" name="Slide Number Placeholder 11"/>
+              <a:t>Demo</a:t>
+            </a:r>
+            <a:endParaRPr lang="en-US" dirty="0"/>
+          </a:p>
+        </p:txBody>
+      </p:sp>
+      <p:sp>
+        <p:nvSpPr>
+          <p:cNvPr id="3" name="Content Placeholder 2"/>
+          <p:cNvSpPr>
+            <a:spLocks noGrp="1"/>
+          </p:cNvSpPr>
+          <p:nvPr>
+            <p:ph idx="1"/>
+          </p:nvPr>
+        </p:nvSpPr>
+        <p:spPr/>
+        <p:txBody>
+          <a:bodyPr/>
+          <a:lstStyle/>
+          <a:p>
+            <a:r>
+              <a:rPr lang="en-US" dirty="0" smtClean="0"/>
+              <a:t>Demonstrated By: Jose </a:t>
+            </a:r>
+          </a:p>
+          <a:p>
+            <a:r>
+              <a:rPr lang="en-US" dirty="0" smtClean="0"/>
+              <a:t>Explained By: Robert and Pandora</a:t>
+            </a:r>
+            <a:endParaRPr lang="en-US" dirty="0"/>
+          </a:p>
+        </p:txBody>
+      </p:sp>
+      <p:sp>
+        <p:nvSpPr>
+          <p:cNvPr id="4" name="Slide Number Placeholder 3"/>
           <p:cNvSpPr>
             <a:spLocks noGrp="1"/>
           </p:cNvSpPr>
@@ -7775,7 +7773,7 @@
     </p:spTree>
     <p:extLst>
       <p:ext uri="{BB962C8B-B14F-4D97-AF65-F5344CB8AC3E}">
-        <p14:creationId xmlns:p14="http://schemas.microsoft.com/office/powerpoint/2010/main" val="3260531771"/>
+        <p14:creationId xmlns:p14="http://schemas.microsoft.com/office/powerpoint/2010/main" val="3429959256"/>
       </p:ext>
     </p:extLst>
   </p:cSld>
@@ -8011,7 +8009,7 @@
           <a:p>
             <a:r>
               <a:rPr lang="en-US" dirty="0" smtClean="0"/>
-              <a:t>Questions</a:t>
+              <a:t>Lessons Learned</a:t>
             </a:r>
             <a:endParaRPr lang="en-US" dirty="0"/>
           </a:p>
@@ -8032,7 +8030,25 @@
           <a:bodyPr/>
           <a:lstStyle/>
           <a:p>
-            <a:endParaRPr lang="en-US"/>
+            <a:r>
+              <a:rPr lang="en-US" dirty="0" smtClean="0"/>
+              <a:t>Value in having an online configuration management tool</a:t>
+            </a:r>
+          </a:p>
+          <a:p>
+            <a:r>
+              <a:rPr lang="en-US" dirty="0" smtClean="0"/>
+              <a:t>Learned how to develop a </a:t>
+            </a:r>
+            <a:r>
+              <a:rPr lang="en-US" dirty="0" err="1" smtClean="0"/>
+              <a:t>RoR</a:t>
+            </a:r>
+            <a:r>
+              <a:rPr lang="en-US" dirty="0" smtClean="0"/>
+              <a:t> application</a:t>
+            </a:r>
+            <a:endParaRPr lang="en-US" dirty="0"/>
           </a:p>
         </p:txBody>
       </p:sp>
@@ -8059,6 +8075,362 @@
           </a:p>
         </p:txBody>
       </p:sp>
+    </p:spTree>
+    <p:extLst>
+      <p:ext uri="{BB962C8B-B14F-4D97-AF65-F5344CB8AC3E}">
+        <p14:creationId xmlns:p14="http://schemas.microsoft.com/office/powerpoint/2010/main" val="2437011028"/>
+      </p:ext>
+    </p:extLst>
+  </p:cSld>
+  <p:clrMapOvr>
+    <a:masterClrMapping/>
+  </p:clrMapOvr>
+</p:sld>
+</file>
+
+<file path=ppt/slides/slide21.xml><?xml version="1.0" encoding="utf-8"?>
+<p:sld xmlns:a="http://schemas.openxmlformats.org/drawingml/2006/main" xmlns:r="http://schemas.openxmlformats.org/officeDocument/2006/relationships" xmlns:p="http://schemas.openxmlformats.org/presentationml/2006/main">
+  <p:cSld>
+    <p:spTree>
+      <p:nvGrpSpPr>
+        <p:cNvPr id="1" name=""/>
+        <p:cNvGrpSpPr/>
+        <p:nvPr/>
+      </p:nvGrpSpPr>
+      <p:grpSpPr>
+        <a:xfrm>
+          <a:off x="0" y="0"/>
+          <a:ext cx="0" cy="0"/>
+          <a:chOff x="0" y="0"/>
+          <a:chExt cx="0" cy="0"/>
+        </a:xfrm>
+      </p:grpSpPr>
+      <p:sp>
+        <p:nvSpPr>
+          <p:cNvPr id="2" name="Title 1"/>
+          <p:cNvSpPr>
+            <a:spLocks noGrp="1"/>
+          </p:cNvSpPr>
+          <p:nvPr>
+            <p:ph type="title"/>
+          </p:nvPr>
+        </p:nvSpPr>
+        <p:spPr/>
+        <p:txBody>
+          <a:bodyPr/>
+          <a:lstStyle/>
+          <a:p>
+            <a:r>
+              <a:rPr lang="en-US" dirty="0" smtClean="0"/>
+              <a:t>Responsibilities: Who Did What</a:t>
+            </a:r>
+            <a:endParaRPr lang="en-US" dirty="0"/>
+          </a:p>
+        </p:txBody>
+      </p:sp>
+      <p:sp>
+        <p:nvSpPr>
+          <p:cNvPr id="10" name="Content Placeholder 9"/>
+          <p:cNvSpPr>
+            <a:spLocks noGrp="1"/>
+          </p:cNvSpPr>
+          <p:nvPr>
+            <p:ph sz="half" idx="1"/>
+          </p:nvPr>
+        </p:nvSpPr>
+        <p:spPr>
+          <a:xfrm>
+            <a:off x="677334" y="1487729"/>
+            <a:ext cx="4184035" cy="3880772"/>
+          </a:xfrm>
+        </p:spPr>
+        <p:txBody>
+          <a:bodyPr>
+            <a:normAutofit fontScale="92500" lnSpcReduction="20000"/>
+          </a:bodyPr>
+          <a:lstStyle/>
+          <a:p>
+            <a:r>
+              <a:rPr lang="en-US" b="1" dirty="0" smtClean="0"/>
+              <a:t>Robert </a:t>
+            </a:r>
+            <a:r>
+              <a:rPr lang="en-US" b="1" dirty="0" err="1" smtClean="0"/>
+              <a:t>Bathmann</a:t>
+            </a:r>
+            <a:endParaRPr lang="en-US" b="1" dirty="0" smtClean="0"/>
+          </a:p>
+          <a:p>
+            <a:pPr lvl="1"/>
+            <a:r>
+              <a:rPr lang="en-US" dirty="0" smtClean="0"/>
+              <a:t>Project Creation</a:t>
+            </a:r>
+          </a:p>
+          <a:p>
+            <a:pPr lvl="1"/>
+            <a:r>
+              <a:rPr lang="en-US" dirty="0" smtClean="0"/>
+              <a:t>Friendship Model</a:t>
+            </a:r>
+          </a:p>
+          <a:p>
+            <a:pPr lvl="1"/>
+            <a:r>
+              <a:rPr lang="en-US" dirty="0" smtClean="0"/>
+              <a:t>Adding Users to Groups</a:t>
+            </a:r>
+          </a:p>
+          <a:p>
+            <a:pPr lvl="1"/>
+            <a:r>
+              <a:rPr lang="en-US" dirty="0" smtClean="0"/>
+              <a:t>Profile creation and modification</a:t>
+            </a:r>
+          </a:p>
+          <a:p>
+            <a:endParaRPr lang="en-US" dirty="0" smtClean="0"/>
+          </a:p>
+          <a:p>
+            <a:r>
+              <a:rPr lang="en-US" b="1" dirty="0" err="1" smtClean="0"/>
+              <a:t>Jlaja</a:t>
+            </a:r>
+            <a:r>
+              <a:rPr lang="en-US" b="1" dirty="0" smtClean="0"/>
+              <a:t> Pandora Podier</a:t>
+            </a:r>
+          </a:p>
+          <a:p>
+            <a:pPr lvl="1"/>
+            <a:r>
+              <a:rPr lang="en-US" dirty="0" smtClean="0"/>
+              <a:t>Established GitHub Repository for version control</a:t>
+            </a:r>
+          </a:p>
+          <a:p>
+            <a:pPr lvl="1"/>
+            <a:r>
+              <a:rPr lang="en-US" dirty="0" smtClean="0"/>
+              <a:t>User </a:t>
+            </a:r>
+            <a:r>
+              <a:rPr lang="en-US" dirty="0"/>
+              <a:t>Login (Facebook Authentication Login</a:t>
+            </a:r>
+            <a:r>
+              <a:rPr lang="en-US" dirty="0" smtClean="0"/>
+              <a:t>)</a:t>
+            </a:r>
+          </a:p>
+          <a:p>
+            <a:pPr lvl="1"/>
+            <a:r>
+              <a:rPr lang="en-US" dirty="0" smtClean="0"/>
+              <a:t>Instantiation of the Wall Post Feature</a:t>
+            </a:r>
+          </a:p>
+          <a:p>
+            <a:pPr lvl="1"/>
+            <a:r>
+              <a:rPr lang="en-US" dirty="0" smtClean="0"/>
+              <a:t>Friendship Model</a:t>
+            </a:r>
+            <a:endParaRPr lang="en-US" dirty="0"/>
+          </a:p>
+          <a:p>
+            <a:pPr lvl="1"/>
+            <a:endParaRPr lang="en-US" dirty="0"/>
+          </a:p>
+        </p:txBody>
+      </p:sp>
+      <p:sp>
+        <p:nvSpPr>
+          <p:cNvPr id="11" name="Content Placeholder 10"/>
+          <p:cNvSpPr>
+            <a:spLocks noGrp="1"/>
+          </p:cNvSpPr>
+          <p:nvPr>
+            <p:ph sz="half" idx="2"/>
+          </p:nvPr>
+        </p:nvSpPr>
+        <p:spPr>
+          <a:xfrm>
+            <a:off x="5089968" y="1487729"/>
+            <a:ext cx="4184034" cy="3880773"/>
+          </a:xfrm>
+        </p:spPr>
+        <p:txBody>
+          <a:bodyPr>
+            <a:normAutofit fontScale="92500" lnSpcReduction="20000"/>
+          </a:bodyPr>
+          <a:lstStyle/>
+          <a:p>
+            <a:r>
+              <a:rPr lang="en-US" b="1" dirty="0" smtClean="0"/>
+              <a:t>Jose </a:t>
+            </a:r>
+            <a:r>
+              <a:rPr lang="en-US" b="1" dirty="0" err="1" smtClean="0"/>
+              <a:t>Quinchuela</a:t>
+            </a:r>
+            <a:endParaRPr lang="en-US" b="1" dirty="0" smtClean="0"/>
+          </a:p>
+          <a:p>
+            <a:pPr lvl="1"/>
+            <a:r>
+              <a:rPr lang="en-US" dirty="0" smtClean="0"/>
+              <a:t>File/Photo Upload</a:t>
+            </a:r>
+          </a:p>
+          <a:p>
+            <a:pPr lvl="1"/>
+            <a:r>
+              <a:rPr lang="en-US" dirty="0" smtClean="0"/>
+              <a:t>Search for Users</a:t>
+            </a:r>
+          </a:p>
+          <a:p>
+            <a:pPr lvl="1"/>
+            <a:r>
+              <a:rPr lang="en-US" dirty="0" smtClean="0"/>
+              <a:t>Friendship Model</a:t>
+            </a:r>
+          </a:p>
+          <a:p>
+            <a:pPr lvl="1"/>
+            <a:r>
+              <a:rPr lang="en-US" dirty="0" smtClean="0"/>
+              <a:t>Profile Edits</a:t>
+            </a:r>
+            <a:endParaRPr lang="en-US" dirty="0"/>
+          </a:p>
+        </p:txBody>
+      </p:sp>
+      <p:sp>
+        <p:nvSpPr>
+          <p:cNvPr id="12" name="Slide Number Placeholder 11"/>
+          <p:cNvSpPr>
+            <a:spLocks noGrp="1"/>
+          </p:cNvSpPr>
+          <p:nvPr>
+            <p:ph type="sldNum" sz="quarter" idx="12"/>
+          </p:nvPr>
+        </p:nvSpPr>
+        <p:spPr/>
+        <p:txBody>
+          <a:bodyPr/>
+          <a:lstStyle/>
+          <a:p>
+            <a:fld id="{519954A3-9DFD-4C44-94BA-B95130A3BA1C}" type="slidenum">
+              <a:rPr lang="en-US" smtClean="0"/>
+              <a:t>21</a:t>
+            </a:fld>
+            <a:endParaRPr lang="en-US" dirty="0"/>
+          </a:p>
+        </p:txBody>
+      </p:sp>
+    </p:spTree>
+    <p:extLst>
+      <p:ext uri="{BB962C8B-B14F-4D97-AF65-F5344CB8AC3E}">
+        <p14:creationId xmlns:p14="http://schemas.microsoft.com/office/powerpoint/2010/main" val="3260531771"/>
+      </p:ext>
+    </p:extLst>
+  </p:cSld>
+  <p:clrMapOvr>
+    <a:masterClrMapping/>
+  </p:clrMapOvr>
+</p:sld>
+</file>
+
+<file path=ppt/slides/slide22.xml><?xml version="1.0" encoding="utf-8"?>
+<p:sld xmlns:a="http://schemas.openxmlformats.org/drawingml/2006/main" xmlns:r="http://schemas.openxmlformats.org/officeDocument/2006/relationships" xmlns:p="http://schemas.openxmlformats.org/presentationml/2006/main">
+  <p:cSld>
+    <p:spTree>
+      <p:nvGrpSpPr>
+        <p:cNvPr id="1" name=""/>
+        <p:cNvGrpSpPr/>
+        <p:nvPr/>
+      </p:nvGrpSpPr>
+      <p:grpSpPr>
+        <a:xfrm>
+          <a:off x="0" y="0"/>
+          <a:ext cx="0" cy="0"/>
+          <a:chOff x="0" y="0"/>
+          <a:chExt cx="0" cy="0"/>
+        </a:xfrm>
+      </p:grpSpPr>
+      <p:sp>
+        <p:nvSpPr>
+          <p:cNvPr id="2" name="Title 1"/>
+          <p:cNvSpPr>
+            <a:spLocks noGrp="1"/>
+          </p:cNvSpPr>
+          <p:nvPr>
+            <p:ph type="title"/>
+          </p:nvPr>
+        </p:nvSpPr>
+        <p:spPr/>
+        <p:txBody>
+          <a:bodyPr/>
+          <a:lstStyle/>
+          <a:p>
+            <a:r>
+              <a:rPr lang="en-US" dirty="0" smtClean="0"/>
+              <a:t>Questions</a:t>
+            </a:r>
+            <a:endParaRPr lang="en-US" dirty="0"/>
+          </a:p>
+        </p:txBody>
+      </p:sp>
+      <p:sp>
+        <p:nvSpPr>
+          <p:cNvPr id="4" name="Slide Number Placeholder 3"/>
+          <p:cNvSpPr>
+            <a:spLocks noGrp="1"/>
+          </p:cNvSpPr>
+          <p:nvPr>
+            <p:ph type="sldNum" sz="quarter" idx="12"/>
+          </p:nvPr>
+        </p:nvSpPr>
+        <p:spPr/>
+        <p:txBody>
+          <a:bodyPr/>
+          <a:lstStyle/>
+          <a:p>
+            <a:fld id="{519954A3-9DFD-4C44-94BA-B95130A3BA1C}" type="slidenum">
+              <a:rPr lang="en-US" smtClean="0"/>
+              <a:t>22</a:t>
+            </a:fld>
+            <a:endParaRPr lang="en-US" dirty="0"/>
+          </a:p>
+        </p:txBody>
+      </p:sp>
+      <p:pic>
+        <p:nvPicPr>
+          <p:cNvPr id="5" name="Content Placeholder 4" descr="MCj04337970000[1]"/>
+          <p:cNvPicPr>
+            <a:picLocks noGrp="1" noChangeAspect="1" noChangeArrowheads="1"/>
+          </p:cNvPicPr>
+          <p:nvPr>
+            <p:ph idx="1"/>
+          </p:nvPr>
+        </p:nvPicPr>
+        <p:blipFill>
+          <a:blip r:embed="rId2" cstate="print"/>
+          <a:srcRect/>
+          <a:stretch>
+            <a:fillRect/>
+          </a:stretch>
+        </p:blipFill>
+        <p:spPr>
+          <a:xfrm>
+            <a:off x="3065463" y="2190750"/>
+            <a:ext cx="3053413" cy="3053413"/>
+          </a:xfrm>
+          <a:noFill/>
+        </p:spPr>
+      </p:pic>
     </p:spTree>
     <p:extLst>
       <p:ext uri="{BB962C8B-B14F-4D97-AF65-F5344CB8AC3E}">
@@ -8274,7 +8646,7 @@
         <p:spPr>
           <a:xfrm>
             <a:off x="888521" y="1435294"/>
-            <a:ext cx="2722566" cy="4606731"/>
+            <a:ext cx="2722566" cy="4736905"/>
           </a:xfrm>
           <a:prstGeom prst="rect">
             <a:avLst/>
@@ -8293,13 +8665,13 @@
         </p:nvSpPr>
         <p:spPr>
           <a:xfrm>
-            <a:off x="5089970" y="1435295"/>
-            <a:ext cx="4184034" cy="4606068"/>
+            <a:off x="5089970" y="1435294"/>
+            <a:ext cx="4184034" cy="4736905"/>
           </a:xfrm>
         </p:spPr>
         <p:txBody>
           <a:bodyPr>
-            <a:normAutofit fontScale="85000" lnSpcReduction="20000"/>
+            <a:normAutofit fontScale="77500" lnSpcReduction="20000"/>
           </a:bodyPr>
           <a:lstStyle/>
           <a:p>
@@ -8354,6 +8726,20 @@
             <a:r>
               <a:rPr lang="en-US" dirty="0" smtClean="0"/>
               <a:t>Add Pictures</a:t>
+            </a:r>
+          </a:p>
+          <a:p>
+            <a:pPr lvl="1"/>
+            <a:r>
+              <a:rPr lang="en-US" dirty="0" smtClean="0"/>
+              <a:t>Add/Update Status</a:t>
+            </a:r>
+          </a:p>
+          <a:p>
+            <a:pPr lvl="1"/>
+            <a:r>
+              <a:rPr lang="en-US" dirty="0" smtClean="0"/>
+              <a:t>Update Profile</a:t>
             </a:r>
           </a:p>
           <a:p>
@@ -8497,7 +8883,7 @@
         <p:spPr>
           <a:xfrm>
             <a:off x="677334" y="1358332"/>
-            <a:ext cx="8596668" cy="4809555"/>
+            <a:ext cx="8596668" cy="5280593"/>
           </a:xfrm>
         </p:spPr>
         <p:txBody>
@@ -8580,6 +8966,13 @@
             <a:r>
               <a:rPr lang="en-US" dirty="0" smtClean="0"/>
               <a:t>Upload Files and Photos (Jose)</a:t>
+            </a:r>
+          </a:p>
+          <a:p>
+            <a:pPr lvl="1"/>
+            <a:r>
+              <a:rPr lang="en-US" dirty="0" smtClean="0"/>
+              <a:t>Profile Creation and Modification (Pandora, Robert and Jose)</a:t>
             </a:r>
             <a:endParaRPr lang="en-US" dirty="0"/>
           </a:p>
@@ -8681,279 +9074,35 @@
           </a:p>
         </p:txBody>
       </p:sp>
-      <p:sp>
-        <p:nvSpPr>
-          <p:cNvPr id="3" name="Content Placeholder 2"/>
-          <p:cNvSpPr>
-            <a:spLocks noGrp="1"/>
-          </p:cNvSpPr>
-          <p:nvPr>
-            <p:ph sz="half" idx="1"/>
-          </p:nvPr>
-        </p:nvSpPr>
+      <p:pic>
+        <p:nvPicPr>
+          <p:cNvPr id="7" name="Content Placeholder 6"/>
+          <p:cNvPicPr>
+            <a:picLocks noGrp="1" noChangeAspect="1"/>
+          </p:cNvPicPr>
+          <p:nvPr>
+            <p:ph idx="1"/>
+          </p:nvPr>
+        </p:nvPicPr>
+        <p:blipFill>
+          <a:blip r:embed="rId2"/>
+          <a:stretch>
+            <a:fillRect/>
+          </a:stretch>
+        </p:blipFill>
         <p:spPr>
           <a:xfrm>
-            <a:off x="677334" y="1479102"/>
-            <a:ext cx="4184035" cy="4171200"/>
-          </a:xfrm>
-        </p:spPr>
-        <p:txBody>
-          <a:bodyPr>
-            <a:normAutofit fontScale="85000" lnSpcReduction="20000"/>
-          </a:bodyPr>
-          <a:lstStyle/>
-          <a:p>
-            <a:r>
-              <a:rPr lang="en-US" dirty="0" smtClean="0"/>
-              <a:t>Friendships</a:t>
-            </a:r>
-          </a:p>
-          <a:p>
-            <a:pPr lvl="1"/>
-            <a:r>
-              <a:rPr lang="en-US" dirty="0" err="1" smtClean="0"/>
-              <a:t>Requester_id</a:t>
-            </a:r>
-            <a:r>
-              <a:rPr lang="en-US" dirty="0" smtClean="0"/>
-              <a:t> (FK)</a:t>
-            </a:r>
-          </a:p>
-          <a:p>
-            <a:pPr lvl="1"/>
-            <a:r>
-              <a:rPr lang="en-US" dirty="0" err="1" smtClean="0"/>
-              <a:t>Granter_id</a:t>
-            </a:r>
-            <a:r>
-              <a:rPr lang="en-US" dirty="0" smtClean="0"/>
-              <a:t> (FK)</a:t>
-            </a:r>
-          </a:p>
-          <a:p>
-            <a:pPr lvl="1"/>
-            <a:r>
-              <a:rPr lang="en-US" dirty="0" smtClean="0"/>
-              <a:t>Accepted</a:t>
-            </a:r>
-          </a:p>
-          <a:p>
-            <a:endParaRPr lang="en-US" dirty="0" smtClean="0"/>
-          </a:p>
-          <a:p>
-            <a:r>
-              <a:rPr lang="en-US" dirty="0" smtClean="0"/>
-              <a:t>Groups</a:t>
-            </a:r>
-          </a:p>
-          <a:p>
-            <a:pPr lvl="1"/>
-            <a:r>
-              <a:rPr lang="en-US" dirty="0" smtClean="0"/>
-              <a:t>Name</a:t>
-            </a:r>
-          </a:p>
-          <a:p>
-            <a:pPr lvl="1"/>
-            <a:r>
-              <a:rPr lang="en-US" dirty="0" err="1" smtClean="0"/>
-              <a:t>Group_id</a:t>
-            </a:r>
-            <a:endParaRPr lang="en-US" dirty="0" smtClean="0"/>
-          </a:p>
-          <a:p>
-            <a:pPr lvl="1"/>
-            <a:endParaRPr lang="en-US" dirty="0"/>
-          </a:p>
-          <a:p>
-            <a:r>
-              <a:rPr lang="en-US" dirty="0" err="1" smtClean="0"/>
-              <a:t>Groups_people</a:t>
-            </a:r>
-            <a:endParaRPr lang="en-US" dirty="0" smtClean="0"/>
-          </a:p>
-          <a:p>
-            <a:pPr lvl="1"/>
-            <a:r>
-              <a:rPr lang="en-US" dirty="0" err="1" smtClean="0"/>
-              <a:t>Person_id</a:t>
-            </a:r>
-            <a:endParaRPr lang="en-US" dirty="0" smtClean="0"/>
-          </a:p>
-          <a:p>
-            <a:pPr lvl="1"/>
-            <a:r>
-              <a:rPr lang="en-US" dirty="0" err="1" smtClean="0"/>
-              <a:t>Group_id</a:t>
-            </a:r>
-            <a:endParaRPr lang="en-US" dirty="0" smtClean="0"/>
-          </a:p>
-          <a:p>
-            <a:pPr lvl="1"/>
-            <a:endParaRPr lang="en-US" dirty="0" smtClean="0"/>
-          </a:p>
-        </p:txBody>
-      </p:sp>
-      <p:sp>
-        <p:nvSpPr>
-          <p:cNvPr id="5" name="Content Placeholder 4"/>
-          <p:cNvSpPr>
-            <a:spLocks noGrp="1"/>
-          </p:cNvSpPr>
-          <p:nvPr>
-            <p:ph sz="half" idx="2"/>
-          </p:nvPr>
-        </p:nvSpPr>
-        <p:spPr>
-          <a:xfrm>
-            <a:off x="5089968" y="1479101"/>
-            <a:ext cx="4184034" cy="4326476"/>
-          </a:xfrm>
-        </p:spPr>
-        <p:txBody>
-          <a:bodyPr>
-            <a:normAutofit fontScale="85000" lnSpcReduction="20000"/>
-          </a:bodyPr>
-          <a:lstStyle/>
-          <a:p>
-            <a:r>
-              <a:rPr lang="en-US" dirty="0" smtClean="0"/>
-              <a:t>People</a:t>
-            </a:r>
-          </a:p>
-          <a:p>
-            <a:pPr lvl="1"/>
-            <a:r>
-              <a:rPr lang="en-US" dirty="0" smtClean="0"/>
-              <a:t>Name</a:t>
-            </a:r>
-          </a:p>
-          <a:p>
-            <a:pPr lvl="1"/>
-            <a:r>
-              <a:rPr lang="en-US" dirty="0" smtClean="0"/>
-              <a:t>Interests</a:t>
-            </a:r>
-            <a:endParaRPr lang="en-US" dirty="0"/>
-          </a:p>
-          <a:p>
-            <a:pPr lvl="1"/>
-            <a:r>
-              <a:rPr lang="en-US" dirty="0"/>
-              <a:t>Hobbies</a:t>
-            </a:r>
-          </a:p>
-          <a:p>
-            <a:pPr lvl="1"/>
-            <a:r>
-              <a:rPr lang="en-US" dirty="0"/>
-              <a:t>Relationship</a:t>
-            </a:r>
-          </a:p>
-          <a:p>
-            <a:pPr lvl="1"/>
-            <a:r>
-              <a:rPr lang="en-US" dirty="0"/>
-              <a:t>Email</a:t>
-            </a:r>
-          </a:p>
-          <a:p>
-            <a:pPr lvl="1"/>
-            <a:r>
-              <a:rPr lang="en-US" dirty="0"/>
-              <a:t>Encrypted Password</a:t>
-            </a:r>
-          </a:p>
-          <a:p>
-            <a:pPr lvl="1"/>
-            <a:r>
-              <a:rPr lang="en-US" dirty="0" err="1"/>
-              <a:t>Reset_password_token</a:t>
-            </a:r>
-            <a:endParaRPr lang="en-US" dirty="0"/>
-          </a:p>
-          <a:p>
-            <a:endParaRPr lang="en-US" dirty="0" smtClean="0"/>
-          </a:p>
-          <a:p>
-            <a:r>
-              <a:rPr lang="en-US" dirty="0" err="1" smtClean="0"/>
-              <a:t>Wall_Posts</a:t>
-            </a:r>
-            <a:endParaRPr lang="en-US" dirty="0" smtClean="0"/>
-          </a:p>
-          <a:p>
-            <a:pPr lvl="1"/>
-            <a:r>
-              <a:rPr lang="en-US" dirty="0" smtClean="0"/>
-              <a:t>Text</a:t>
-            </a:r>
-          </a:p>
-          <a:p>
-            <a:pPr lvl="1"/>
-            <a:r>
-              <a:rPr lang="en-US" dirty="0" smtClean="0"/>
-              <a:t>Date</a:t>
-            </a:r>
-          </a:p>
-          <a:p>
-            <a:pPr lvl="1"/>
-            <a:r>
-              <a:rPr lang="en-US" dirty="0" err="1" smtClean="0"/>
-              <a:t>Person_id</a:t>
-            </a:r>
-            <a:endParaRPr lang="en-US" dirty="0" smtClean="0"/>
-          </a:p>
-          <a:p>
-            <a:pPr lvl="1"/>
-            <a:r>
-              <a:rPr lang="en-US" dirty="0" err="1" smtClean="0"/>
-              <a:t>Author_id</a:t>
-            </a:r>
-            <a:r>
-              <a:rPr lang="en-US" dirty="0" smtClean="0"/>
-              <a:t> (FK)</a:t>
-            </a:r>
-            <a:endParaRPr lang="en-US" dirty="0"/>
-          </a:p>
-          <a:p>
-            <a:endParaRPr lang="en-US" dirty="0"/>
-          </a:p>
-        </p:txBody>
-      </p:sp>
-      <p:sp>
-        <p:nvSpPr>
-          <p:cNvPr id="4" name="TextBox 3"/>
-          <p:cNvSpPr txBox="1"/>
-          <p:nvPr/>
-        </p:nvSpPr>
-        <p:spPr>
-          <a:xfrm>
-            <a:off x="1475117" y="5745192"/>
-            <a:ext cx="3614851" cy="369332"/>
+            <a:off x="964642" y="1279710"/>
+            <a:ext cx="8229599" cy="4848645"/>
           </a:xfrm>
           <a:prstGeom prst="rect">
             <a:avLst/>
           </a:prstGeom>
-          <a:noFill/>
         </p:spPr>
-        <p:txBody>
-          <a:bodyPr wrap="square" rtlCol="0">
-            <a:spAutoFit/>
-          </a:bodyPr>
-          <a:lstStyle/>
-          <a:p>
-            <a:r>
-              <a:rPr lang="en-US" dirty="0" smtClean="0"/>
-              <a:t>**NOTE: Id is explicitly created. </a:t>
-            </a:r>
-            <a:endParaRPr lang="en-US" dirty="0"/>
-          </a:p>
-        </p:txBody>
-      </p:sp>
-      <p:sp>
-        <p:nvSpPr>
-          <p:cNvPr id="6" name="Slide Number Placeholder 5"/>
+      </p:pic>
+      <p:sp>
+        <p:nvSpPr>
+          <p:cNvPr id="5" name="Slide Number Placeholder 4"/>
           <p:cNvSpPr>
             <a:spLocks noGrp="1"/>
           </p:cNvSpPr>
@@ -8977,7 +9126,7 @@
     </p:spTree>
     <p:extLst>
       <p:ext uri="{BB962C8B-B14F-4D97-AF65-F5344CB8AC3E}">
-        <p14:creationId xmlns:p14="http://schemas.microsoft.com/office/powerpoint/2010/main" val="3310166343"/>
+        <p14:creationId xmlns:p14="http://schemas.microsoft.com/office/powerpoint/2010/main" val="779329364"/>
       </p:ext>
     </p:extLst>
   </p:cSld>
@@ -9021,7 +9170,7 @@
           <a:p>
             <a:r>
               <a:rPr lang="en-US" dirty="0" smtClean="0"/>
-              <a:t>User Stories/Use Cases </a:t>
+              <a:t>Data Models</a:t>
             </a:r>
             <a:endParaRPr lang="en-US" dirty="0"/>
           </a:p>
@@ -9034,254 +9183,272 @@
             <a:spLocks noGrp="1"/>
           </p:cNvSpPr>
           <p:nvPr>
-            <p:ph idx="1"/>
+            <p:ph sz="half" idx="1"/>
           </p:nvPr>
         </p:nvSpPr>
         <p:spPr>
           <a:xfrm>
-            <a:off x="677334" y="1270000"/>
-            <a:ext cx="8596668" cy="5502589"/>
+            <a:off x="677334" y="1479102"/>
+            <a:ext cx="4184035" cy="4171200"/>
           </a:xfrm>
         </p:spPr>
         <p:txBody>
           <a:bodyPr>
-            <a:noAutofit/>
+            <a:normAutofit fontScale="85000" lnSpcReduction="20000"/>
           </a:bodyPr>
           <a:lstStyle/>
           <a:p>
             <a:r>
-              <a:rPr lang="en-US" sz="1200" dirty="0" smtClean="0"/>
-              <a:t>Creating Profile</a:t>
-            </a:r>
-          </a:p>
-          <a:p>
-            <a:pPr marL="457200" lvl="1" indent="0">
-              <a:buNone/>
-            </a:pPr>
-            <a:r>
-              <a:rPr lang="en-US" sz="1200" dirty="0" smtClean="0"/>
-              <a:t>1. Go to the Welcome Page of </a:t>
-            </a:r>
-            <a:r>
-              <a:rPr lang="en-US" sz="1200" dirty="0" err="1" smtClean="0"/>
-              <a:t>TowsonBook</a:t>
-            </a:r>
-            <a:r>
-              <a:rPr lang="en-US" sz="1200" dirty="0" smtClean="0"/>
-              <a:t> and select Get Started</a:t>
-            </a:r>
-          </a:p>
-          <a:p>
-            <a:pPr marL="457200" lvl="1" indent="0">
-              <a:buNone/>
-            </a:pPr>
-            <a:r>
-              <a:rPr lang="en-US" sz="1200" dirty="0" smtClean="0"/>
-              <a:t>2. Select Sign-Up Link at the lower left</a:t>
-            </a:r>
-          </a:p>
-          <a:p>
-            <a:pPr marL="457200" lvl="1" indent="0">
-              <a:buNone/>
-            </a:pPr>
-            <a:r>
-              <a:rPr lang="en-US" sz="1200" dirty="0" smtClean="0"/>
-              <a:t>3. Enter in email address and create password with a minimum of 6 characters</a:t>
-            </a:r>
-          </a:p>
-          <a:p>
-            <a:pPr marL="457200" lvl="1" indent="0">
-              <a:buNone/>
-            </a:pPr>
-            <a:r>
-              <a:rPr lang="en-US" sz="1200" dirty="0" smtClean="0"/>
-              <a:t>4. Click the Sign Up Button</a:t>
-            </a:r>
-          </a:p>
-          <a:p>
-            <a:r>
-              <a:rPr lang="en-US" sz="1200" dirty="0" smtClean="0"/>
-              <a:t>Updating Profile Information</a:t>
-            </a:r>
-          </a:p>
-          <a:p>
-            <a:pPr marL="457200" lvl="1" indent="0">
-              <a:buNone/>
-            </a:pPr>
-            <a:r>
-              <a:rPr lang="en-US" sz="1200" dirty="0" smtClean="0"/>
-              <a:t>1. Login </a:t>
-            </a:r>
-            <a:r>
-              <a:rPr lang="en-US" sz="1200" dirty="0"/>
-              <a:t>to your </a:t>
-            </a:r>
-            <a:r>
-              <a:rPr lang="en-US" sz="1200" dirty="0" err="1"/>
-              <a:t>Towsonbook</a:t>
-            </a:r>
-            <a:r>
-              <a:rPr lang="en-US" sz="1200" dirty="0"/>
-              <a:t> account</a:t>
-            </a:r>
-          </a:p>
-          <a:p>
-            <a:pPr marL="457200" lvl="1" indent="0">
-              <a:buNone/>
-            </a:pPr>
-            <a:r>
-              <a:rPr lang="en-US" sz="1200" dirty="0" smtClean="0"/>
-              <a:t>2</a:t>
-            </a:r>
-            <a:r>
-              <a:rPr lang="en-US" sz="1200" dirty="0"/>
-              <a:t>. </a:t>
-            </a:r>
-            <a:r>
-              <a:rPr lang="en-US" sz="1200" dirty="0" smtClean="0"/>
-              <a:t>Click the My Profile Link at the top of the page</a:t>
-            </a:r>
-            <a:endParaRPr lang="en-US" sz="1200" dirty="0"/>
-          </a:p>
-          <a:p>
-            <a:pPr marL="457200" lvl="1" indent="0">
-              <a:buNone/>
-            </a:pPr>
-            <a:r>
-              <a:rPr lang="en-US" sz="1200" dirty="0" smtClean="0"/>
-              <a:t>3. Click the Edit My Profile Button</a:t>
-            </a:r>
-          </a:p>
-          <a:p>
-            <a:pPr marL="457200" lvl="1" indent="0">
-              <a:buNone/>
-            </a:pPr>
-            <a:r>
-              <a:rPr lang="en-US" sz="1200" dirty="0" smtClean="0"/>
-              <a:t>4. Update any of the fields you want to change (Name, email, profile photo, Relationship status, Hobbies, Interest, etc.)</a:t>
-            </a:r>
-            <a:endParaRPr lang="en-US" sz="1200" dirty="0"/>
-          </a:p>
-          <a:p>
-            <a:pPr marL="457200" lvl="1" indent="0">
-              <a:buNone/>
-            </a:pPr>
-            <a:r>
-              <a:rPr lang="en-US" sz="1200" dirty="0" smtClean="0"/>
-              <a:t>5. </a:t>
-            </a:r>
-            <a:r>
-              <a:rPr lang="en-US" sz="1200" dirty="0"/>
-              <a:t>Click the </a:t>
-            </a:r>
-            <a:r>
-              <a:rPr lang="en-US" sz="1200" dirty="0" smtClean="0"/>
-              <a:t>Update Person Button to save the changes</a:t>
-            </a:r>
-            <a:endParaRPr lang="en-US" sz="1200" dirty="0"/>
-          </a:p>
-          <a:p>
-            <a:r>
-              <a:rPr lang="en-US" sz="1200" dirty="0" smtClean="0"/>
-              <a:t>Adding Friends</a:t>
-            </a:r>
-          </a:p>
-          <a:p>
-            <a:pPr marL="457200" lvl="1" indent="0">
-              <a:buNone/>
-            </a:pPr>
-            <a:r>
-              <a:rPr lang="en-US" sz="1200" dirty="0"/>
-              <a:t>1. Login to your </a:t>
-            </a:r>
-            <a:r>
-              <a:rPr lang="en-US" sz="1200" dirty="0" err="1"/>
-              <a:t>Towsonbook</a:t>
-            </a:r>
-            <a:r>
-              <a:rPr lang="en-US" sz="1200" dirty="0"/>
-              <a:t> account</a:t>
-            </a:r>
-          </a:p>
-          <a:p>
-            <a:pPr marL="457200" lvl="1" indent="0">
-              <a:buNone/>
-            </a:pPr>
-            <a:r>
-              <a:rPr lang="en-US" sz="1200" dirty="0"/>
-              <a:t>2. Click the </a:t>
-            </a:r>
-            <a:r>
-              <a:rPr lang="en-US" sz="1200" dirty="0" smtClean="0"/>
-              <a:t>People Link </a:t>
-            </a:r>
-            <a:r>
-              <a:rPr lang="en-US" sz="1200" dirty="0"/>
-              <a:t>at the top of the page</a:t>
-            </a:r>
-          </a:p>
-          <a:p>
-            <a:pPr marL="457200" lvl="1" indent="0">
-              <a:buNone/>
-            </a:pPr>
-            <a:r>
-              <a:rPr lang="en-US" sz="1200" dirty="0"/>
-              <a:t>3. </a:t>
-            </a:r>
-            <a:r>
-              <a:rPr lang="en-US" sz="1200" dirty="0" smtClean="0"/>
-              <a:t>Friendships can be managed here via the radio buttons. User can request to Add a Friend, Confirm a Friend, or Cancel Friend Request </a:t>
-            </a:r>
-            <a:r>
-              <a:rPr lang="en-US" sz="1200" dirty="0"/>
-              <a:t>of the fields you want Relationship status, Hobbies, Interest, etc.)</a:t>
-            </a:r>
-            <a:r>
-              <a:rPr lang="en-US" sz="1200" dirty="0" smtClean="0"/>
-              <a:t>to </a:t>
-            </a:r>
-            <a:r>
-              <a:rPr lang="en-US" sz="1200" dirty="0"/>
-              <a:t>change (Name, email, profile photo, </a:t>
-            </a:r>
-          </a:p>
-          <a:p>
-            <a:pPr marL="457200" lvl="1" indent="0">
-              <a:buNone/>
-            </a:pPr>
-            <a:r>
-              <a:rPr lang="en-US" sz="1200" dirty="0" smtClean="0"/>
-              <a:t>4. </a:t>
-            </a:r>
-            <a:r>
-              <a:rPr lang="en-US" sz="1200" dirty="0"/>
-              <a:t>Click the </a:t>
-            </a:r>
-            <a:r>
-              <a:rPr lang="en-US" sz="1200" dirty="0" smtClean="0"/>
-              <a:t>Button of your choice </a:t>
-            </a:r>
-            <a:r>
-              <a:rPr lang="en-US" sz="1200" dirty="0"/>
-              <a:t>to </a:t>
-            </a:r>
-            <a:r>
-              <a:rPr lang="en-US" sz="1200" dirty="0" smtClean="0"/>
-              <a:t>manage friendship</a:t>
-            </a:r>
-            <a:endParaRPr lang="en-US" sz="1200" dirty="0"/>
-          </a:p>
-          <a:p>
-            <a:endParaRPr lang="en-US" sz="1200" dirty="0" smtClean="0"/>
-          </a:p>
-          <a:p>
-            <a:endParaRPr lang="en-US" sz="1200" dirty="0" smtClean="0"/>
-          </a:p>
-        </p:txBody>
-      </p:sp>
-      <p:sp>
-        <p:nvSpPr>
-          <p:cNvPr id="4" name="Slide Number Placeholder 3"/>
+              <a:rPr lang="en-US" dirty="0" smtClean="0"/>
+              <a:t>Friendships</a:t>
+            </a:r>
+          </a:p>
+          <a:p>
+            <a:pPr lvl="1"/>
+            <a:r>
+              <a:rPr lang="en-US" dirty="0" err="1" smtClean="0"/>
+              <a:t>Requester_id</a:t>
+            </a:r>
+            <a:r>
+              <a:rPr lang="en-US" dirty="0" smtClean="0"/>
+              <a:t> (FK)</a:t>
+            </a:r>
+          </a:p>
+          <a:p>
+            <a:pPr lvl="1"/>
+            <a:r>
+              <a:rPr lang="en-US" dirty="0" err="1" smtClean="0"/>
+              <a:t>Granter_id</a:t>
+            </a:r>
+            <a:r>
+              <a:rPr lang="en-US" dirty="0" smtClean="0"/>
+              <a:t> (FK)</a:t>
+            </a:r>
+          </a:p>
+          <a:p>
+            <a:pPr lvl="1"/>
+            <a:r>
+              <a:rPr lang="en-US" dirty="0" smtClean="0"/>
+              <a:t>Accepted</a:t>
+            </a:r>
+          </a:p>
+          <a:p>
+            <a:endParaRPr lang="en-US" dirty="0" smtClean="0"/>
+          </a:p>
+          <a:p>
+            <a:r>
+              <a:rPr lang="en-US" dirty="0" smtClean="0"/>
+              <a:t>Groups</a:t>
+            </a:r>
+          </a:p>
+          <a:p>
+            <a:pPr lvl="1"/>
+            <a:r>
+              <a:rPr lang="en-US" dirty="0" smtClean="0"/>
+              <a:t>Name</a:t>
+            </a:r>
+          </a:p>
+          <a:p>
+            <a:pPr lvl="1"/>
+            <a:r>
+              <a:rPr lang="en-US" dirty="0" err="1" smtClean="0"/>
+              <a:t>Group_id</a:t>
+            </a:r>
+            <a:endParaRPr lang="en-US" dirty="0" smtClean="0"/>
+          </a:p>
+          <a:p>
+            <a:pPr lvl="1"/>
+            <a:endParaRPr lang="en-US" dirty="0"/>
+          </a:p>
+          <a:p>
+            <a:r>
+              <a:rPr lang="en-US" dirty="0" err="1" smtClean="0"/>
+              <a:t>Groups_people</a:t>
+            </a:r>
+            <a:endParaRPr lang="en-US" dirty="0" smtClean="0"/>
+          </a:p>
+          <a:p>
+            <a:pPr lvl="1"/>
+            <a:r>
+              <a:rPr lang="en-US" dirty="0" err="1" smtClean="0"/>
+              <a:t>Person_id</a:t>
+            </a:r>
+            <a:endParaRPr lang="en-US" dirty="0" smtClean="0"/>
+          </a:p>
+          <a:p>
+            <a:pPr lvl="1"/>
+            <a:r>
+              <a:rPr lang="en-US" dirty="0" err="1" smtClean="0"/>
+              <a:t>Group_id</a:t>
+            </a:r>
+            <a:endParaRPr lang="en-US" dirty="0" smtClean="0"/>
+          </a:p>
+          <a:p>
+            <a:pPr lvl="1"/>
+            <a:endParaRPr lang="en-US" dirty="0" smtClean="0"/>
+          </a:p>
+        </p:txBody>
+      </p:sp>
+      <p:sp>
+        <p:nvSpPr>
+          <p:cNvPr id="5" name="Content Placeholder 4"/>
+          <p:cNvSpPr>
+            <a:spLocks noGrp="1"/>
+          </p:cNvSpPr>
+          <p:nvPr>
+            <p:ph sz="half" idx="2"/>
+          </p:nvPr>
+        </p:nvSpPr>
+        <p:spPr>
+          <a:xfrm>
+            <a:off x="5089968" y="1479101"/>
+            <a:ext cx="4184034" cy="4326476"/>
+          </a:xfrm>
+        </p:spPr>
+        <p:txBody>
+          <a:bodyPr>
+            <a:normAutofit fontScale="85000" lnSpcReduction="20000"/>
+          </a:bodyPr>
+          <a:lstStyle/>
+          <a:p>
+            <a:r>
+              <a:rPr lang="en-US" dirty="0" smtClean="0"/>
+              <a:t>People</a:t>
+            </a:r>
+          </a:p>
+          <a:p>
+            <a:pPr lvl="1"/>
+            <a:r>
+              <a:rPr lang="en-US" dirty="0" smtClean="0"/>
+              <a:t>Name</a:t>
+            </a:r>
+          </a:p>
+          <a:p>
+            <a:pPr lvl="1"/>
+            <a:r>
+              <a:rPr lang="en-US" dirty="0" smtClean="0"/>
+              <a:t>Interests</a:t>
+            </a:r>
+            <a:endParaRPr lang="en-US" dirty="0"/>
+          </a:p>
+          <a:p>
+            <a:pPr lvl="1"/>
+            <a:r>
+              <a:rPr lang="en-US" dirty="0"/>
+              <a:t>Hobbies</a:t>
+            </a:r>
+          </a:p>
+          <a:p>
+            <a:pPr lvl="1"/>
+            <a:r>
+              <a:rPr lang="en-US" dirty="0"/>
+              <a:t>Relationship</a:t>
+            </a:r>
+          </a:p>
+          <a:p>
+            <a:pPr lvl="1"/>
+            <a:r>
+              <a:rPr lang="en-US" dirty="0"/>
+              <a:t>Email</a:t>
+            </a:r>
+          </a:p>
+          <a:p>
+            <a:pPr lvl="1"/>
+            <a:r>
+              <a:rPr lang="en-US" dirty="0"/>
+              <a:t>Encrypted Password</a:t>
+            </a:r>
+          </a:p>
+          <a:p>
+            <a:pPr lvl="1"/>
+            <a:r>
+              <a:rPr lang="en-US" dirty="0" err="1"/>
+              <a:t>Reset_password_token</a:t>
+            </a:r>
+            <a:endParaRPr lang="en-US" dirty="0"/>
+          </a:p>
+          <a:p>
+            <a:endParaRPr lang="en-US" dirty="0" smtClean="0"/>
+          </a:p>
+          <a:p>
+            <a:r>
+              <a:rPr lang="en-US" dirty="0" err="1" smtClean="0"/>
+              <a:t>Wall_Posts</a:t>
+            </a:r>
+            <a:endParaRPr lang="en-US" dirty="0" smtClean="0"/>
+          </a:p>
+          <a:p>
+            <a:pPr lvl="1"/>
+            <a:r>
+              <a:rPr lang="en-US" dirty="0" smtClean="0"/>
+              <a:t>Text</a:t>
+            </a:r>
+          </a:p>
+          <a:p>
+            <a:pPr lvl="1"/>
+            <a:r>
+              <a:rPr lang="en-US" dirty="0" smtClean="0"/>
+              <a:t>Date</a:t>
+            </a:r>
+          </a:p>
+          <a:p>
+            <a:pPr lvl="1"/>
+            <a:r>
+              <a:rPr lang="en-US" dirty="0" err="1" smtClean="0"/>
+              <a:t>Person_id</a:t>
+            </a:r>
+            <a:endParaRPr lang="en-US" dirty="0" smtClean="0"/>
+          </a:p>
+          <a:p>
+            <a:pPr lvl="1"/>
+            <a:r>
+              <a:rPr lang="en-US" dirty="0" err="1" smtClean="0"/>
+              <a:t>Author_id</a:t>
+            </a:r>
+            <a:r>
+              <a:rPr lang="en-US" dirty="0" smtClean="0"/>
+              <a:t> (FK)</a:t>
+            </a:r>
+            <a:endParaRPr lang="en-US" dirty="0"/>
+          </a:p>
+          <a:p>
+            <a:endParaRPr lang="en-US" dirty="0"/>
+          </a:p>
+        </p:txBody>
+      </p:sp>
+      <p:sp>
+        <p:nvSpPr>
+          <p:cNvPr id="4" name="TextBox 3"/>
+          <p:cNvSpPr txBox="1"/>
+          <p:nvPr/>
+        </p:nvSpPr>
+        <p:spPr>
+          <a:xfrm>
+            <a:off x="1475117" y="5745192"/>
+            <a:ext cx="3614851" cy="369332"/>
+          </a:xfrm>
+          <a:prstGeom prst="rect">
+            <a:avLst/>
+          </a:prstGeom>
+          <a:noFill/>
+        </p:spPr>
+        <p:txBody>
+          <a:bodyPr wrap="square" rtlCol="0">
+            <a:spAutoFit/>
+          </a:bodyPr>
+          <a:lstStyle/>
+          <a:p>
+            <a:r>
+              <a:rPr lang="en-US" dirty="0" smtClean="0"/>
+              <a:t>**NOTE: Id is explicitly created. </a:t>
+            </a:r>
+            <a:endParaRPr lang="en-US" dirty="0"/>
+          </a:p>
+        </p:txBody>
+      </p:sp>
+      <p:sp>
+        <p:nvSpPr>
+          <p:cNvPr id="6" name="Slide Number Placeholder 5"/>
           <p:cNvSpPr>
             <a:spLocks noGrp="1"/>
           </p:cNvSpPr>
@@ -9305,7 +9472,7 @@
     </p:spTree>
     <p:extLst>
       <p:ext uri="{BB962C8B-B14F-4D97-AF65-F5344CB8AC3E}">
-        <p14:creationId xmlns:p14="http://schemas.microsoft.com/office/powerpoint/2010/main" val="639174694"/>
+        <p14:creationId xmlns:p14="http://schemas.microsoft.com/office/powerpoint/2010/main" val="3310166343"/>
       </p:ext>
     </p:extLst>
   </p:cSld>
@@ -9349,7 +9516,7 @@
           <a:p>
             <a:r>
               <a:rPr lang="en-US" dirty="0" smtClean="0"/>
-              <a:t>User Stories/Use Cases (cont’d) </a:t>
+              <a:t>User Stories/Use Cases </a:t>
             </a:r>
             <a:endParaRPr lang="en-US" dirty="0"/>
           </a:p>
@@ -9367,8 +9534,8 @@
         </p:nvSpPr>
         <p:spPr>
           <a:xfrm>
-            <a:off x="677334" y="1407554"/>
-            <a:ext cx="8596668" cy="5199434"/>
+            <a:off x="677334" y="1270000"/>
+            <a:ext cx="8596668" cy="5502589"/>
           </a:xfrm>
         </p:spPr>
         <p:txBody>
@@ -9378,8 +9545,8 @@
           <a:lstStyle/>
           <a:p>
             <a:r>
-              <a:rPr lang="en-US" sz="1400" dirty="0" smtClean="0"/>
-              <a:t>Joining Groups</a:t>
+              <a:rPr lang="en-US" sz="1200" dirty="0" smtClean="0"/>
+              <a:t>Creating Profile</a:t>
             </a:r>
           </a:p>
           <a:p>
@@ -9387,15 +9554,147 @@
               <a:buNone/>
             </a:pPr>
             <a:r>
-              <a:rPr lang="en-US" sz="1400" dirty="0"/>
+              <a:rPr lang="en-US" sz="1200" dirty="0" smtClean="0"/>
+              <a:t>1. Go to the Welcome Page of </a:t>
+            </a:r>
+            <a:r>
+              <a:rPr lang="en-US" sz="1200" dirty="0" err="1" smtClean="0"/>
+              <a:t>TowsonBook</a:t>
+            </a:r>
+            <a:r>
+              <a:rPr lang="en-US" sz="1200" dirty="0" smtClean="0"/>
+              <a:t> and select Get Started</a:t>
+            </a:r>
+          </a:p>
+          <a:p>
+            <a:pPr marL="457200" lvl="1" indent="0">
+              <a:buNone/>
+            </a:pPr>
+            <a:r>
+              <a:rPr lang="en-US" sz="1200" dirty="0" smtClean="0"/>
+              <a:t>2. Select Sign-Up Link at the lower left</a:t>
+            </a:r>
+          </a:p>
+          <a:p>
+            <a:pPr marL="457200" lvl="1" indent="0">
+              <a:buNone/>
+            </a:pPr>
+            <a:r>
+              <a:rPr lang="en-US" sz="1200" dirty="0" smtClean="0"/>
+              <a:t>3. Enter in email address and create password with a minimum of 6 characters</a:t>
+            </a:r>
+          </a:p>
+          <a:p>
+            <a:pPr marL="457200" lvl="1" indent="0">
+              <a:buNone/>
+            </a:pPr>
+            <a:r>
+              <a:rPr lang="en-US" sz="1200" dirty="0" smtClean="0"/>
+              <a:t>4. Click the Sign Up Button</a:t>
+            </a:r>
+          </a:p>
+          <a:p>
+            <a:r>
+              <a:rPr lang="en-US" sz="1200" dirty="0" smtClean="0"/>
+              <a:t>Updating Profile Information</a:t>
+            </a:r>
+          </a:p>
+          <a:p>
+            <a:pPr marL="457200" lvl="1" indent="0">
+              <a:buNone/>
+            </a:pPr>
+            <a:r>
+              <a:rPr lang="en-US" sz="1200" dirty="0" smtClean="0"/>
+              <a:t>1. Login </a:t>
+            </a:r>
+            <a:r>
+              <a:rPr lang="en-US" sz="1200" dirty="0"/>
+              <a:t>to your </a:t>
+            </a:r>
+            <a:r>
+              <a:rPr lang="en-US" sz="1200" dirty="0" err="1"/>
+              <a:t>Towsonbook</a:t>
+            </a:r>
+            <a:r>
+              <a:rPr lang="en-US" sz="1200" dirty="0"/>
+              <a:t> account</a:t>
+            </a:r>
+          </a:p>
+          <a:p>
+            <a:pPr marL="457200" lvl="1" indent="0">
+              <a:buNone/>
+            </a:pPr>
+            <a:r>
+              <a:rPr lang="en-US" sz="1200" dirty="0" smtClean="0"/>
+              <a:t>2</a:t>
+            </a:r>
+            <a:r>
+              <a:rPr lang="en-US" sz="1200" dirty="0"/>
+              <a:t>. </a:t>
+            </a:r>
+            <a:r>
+              <a:rPr lang="en-US" sz="1200" dirty="0" smtClean="0"/>
+              <a:t>Click the My Profile Link at the top of the page</a:t>
+            </a:r>
+            <a:endParaRPr lang="en-US" sz="1200" dirty="0"/>
+          </a:p>
+          <a:p>
+            <a:pPr marL="457200" lvl="1" indent="0">
+              <a:buNone/>
+            </a:pPr>
+            <a:r>
+              <a:rPr lang="en-US" sz="1200" dirty="0" smtClean="0"/>
+              <a:t>3. Click the Edit My Profile Button</a:t>
+            </a:r>
+          </a:p>
+          <a:p>
+            <a:pPr marL="457200" lvl="1" indent="0">
+              <a:buNone/>
+            </a:pPr>
+            <a:r>
+              <a:rPr lang="en-US" sz="1200" dirty="0" smtClean="0"/>
+              <a:t>4. Update any of the fields you want to change (Name, email, profile photo, Relationship status, Hobbies, Interest, etc.)</a:t>
+            </a:r>
+            <a:endParaRPr lang="en-US" sz="1200" dirty="0"/>
+          </a:p>
+          <a:p>
+            <a:pPr marL="457200" lvl="1" indent="0">
+              <a:buNone/>
+            </a:pPr>
+            <a:r>
+              <a:rPr lang="en-US" sz="1200" dirty="0" smtClean="0"/>
+              <a:t>5. </a:t>
+            </a:r>
+            <a:r>
+              <a:rPr lang="en-US" sz="1200" dirty="0"/>
+              <a:t>Click the </a:t>
+            </a:r>
+            <a:r>
+              <a:rPr lang="en-US" sz="1200" dirty="0" smtClean="0"/>
+              <a:t>Update Person Button to save the changes</a:t>
+            </a:r>
+            <a:endParaRPr lang="en-US" sz="1200" dirty="0"/>
+          </a:p>
+          <a:p>
+            <a:r>
+              <a:rPr lang="en-US" sz="1200" dirty="0" smtClean="0"/>
+              <a:t>Adding Friends</a:t>
+            </a:r>
+          </a:p>
+          <a:p>
+            <a:pPr marL="457200" lvl="1" indent="0">
+              <a:buNone/>
+            </a:pPr>
+            <a:r>
+              <a:rPr lang="en-US" sz="1200" dirty="0"/>
               <a:t>1. Login to your </a:t>
             </a:r>
             <a:r>
-              <a:rPr lang="en-US" sz="1400" dirty="0" err="1"/>
+              <a:rPr lang="en-US" sz="1200" dirty="0" err="1"/>
               <a:t>Towsonbook</a:t>
             </a:r>
             <a:r>
-              <a:rPr lang="en-US" sz="1400" dirty="0"/>
+              <a:rPr lang="en-US" sz="1200" dirty="0"/>
               <a:t> account</a:t>
             </a:r>
           </a:p>
@@ -9404,15 +9703,15 @@
               <a:buNone/>
             </a:pPr>
             <a:r>
-              <a:rPr lang="en-US" sz="1400" dirty="0"/>
+              <a:rPr lang="en-US" sz="1200" dirty="0"/>
               <a:t>2. Click the </a:t>
             </a:r>
             <a:r>
-              <a:rPr lang="en-US" sz="1400" dirty="0" smtClean="0"/>
-              <a:t>Groups Link </a:t>
-            </a:r>
-            <a:r>
-              <a:rPr lang="en-US" sz="1400" dirty="0"/>
+              <a:rPr lang="en-US" sz="1200" dirty="0" smtClean="0"/>
+              <a:t>People Link </a:t>
+            </a:r>
+            <a:r>
+              <a:rPr lang="en-US" sz="1200" dirty="0"/>
               <a:t>at the top of the page</a:t>
             </a:r>
           </a:p>
@@ -9421,22 +9720,24 @@
               <a:buNone/>
             </a:pPr>
             <a:r>
-              <a:rPr lang="en-US" sz="1400" dirty="0"/>
+              <a:rPr lang="en-US" sz="1200" dirty="0"/>
               <a:t>3. </a:t>
             </a:r>
             <a:r>
-              <a:rPr lang="en-US" sz="1400" dirty="0" smtClean="0"/>
-              <a:t> Manage Groups There (Join Groups or Leave Groups)</a:t>
-            </a:r>
-            <a:endParaRPr lang="en-US" sz="1400" dirty="0"/>
-          </a:p>
-          <a:p>
-            <a:endParaRPr lang="en-US" sz="1400" dirty="0" smtClean="0"/>
-          </a:p>
-          <a:p>
-            <a:r>
-              <a:rPr lang="en-US" sz="1400" dirty="0" smtClean="0"/>
-              <a:t>Writing Wall Posts</a:t>
+              <a:rPr lang="en-US" sz="1200" dirty="0" smtClean="0"/>
+              <a:t>Friendships can be managed here via the radio buttons. User can request to Add a Friend, Confirm a Friend, or Cancel Friend Request </a:t>
+            </a:r>
+            <a:r>
+              <a:rPr lang="en-US" sz="1200" dirty="0"/>
+              <a:t>of the fields you want Relationship status, Hobbies, Interest, etc.)</a:t>
+            </a:r>
+            <a:r>
+              <a:rPr lang="en-US" sz="1200" dirty="0" smtClean="0"/>
+              <a:t>to </a:t>
+            </a:r>
+            <a:r>
+              <a:rPr lang="en-US" sz="1200" dirty="0"/>
+              <a:t>change (Name, email, profile photo, </a:t>
             </a:r>
           </a:p>
           <a:p>
@@ -9444,108 +9745,32 @@
               <a:buNone/>
             </a:pPr>
             <a:r>
-              <a:rPr lang="en-US" sz="1400" dirty="0"/>
-              <a:t>1. Login to your </a:t>
-            </a:r>
-            <a:r>
-              <a:rPr lang="en-US" sz="1400" dirty="0" err="1"/>
-              <a:t>Towsonbook</a:t>
-            </a:r>
-            <a:r>
-              <a:rPr lang="en-US" sz="1400" dirty="0"/>
-              <a:t> account</a:t>
-            </a:r>
-          </a:p>
-          <a:p>
-            <a:pPr marL="457200" lvl="1" indent="0">
-              <a:buNone/>
-            </a:pPr>
-            <a:r>
-              <a:rPr lang="en-US" sz="1400" dirty="0" smtClean="0"/>
-              <a:t>2. Click the </a:t>
-            </a:r>
-          </a:p>
-          <a:p>
-            <a:endParaRPr lang="en-US" sz="1400" dirty="0" smtClean="0"/>
-          </a:p>
-          <a:p>
-            <a:r>
-              <a:rPr lang="en-US" sz="1400" dirty="0" smtClean="0"/>
-              <a:t>Searching for Users</a:t>
-            </a:r>
-          </a:p>
-          <a:p>
-            <a:pPr marL="457200" lvl="1" indent="0">
-              <a:buNone/>
-            </a:pPr>
-            <a:r>
-              <a:rPr lang="en-US" sz="1400" dirty="0" smtClean="0"/>
-              <a:t>1. Login </a:t>
-            </a:r>
-            <a:r>
-              <a:rPr lang="en-US" sz="1400" dirty="0"/>
-              <a:t>to your </a:t>
-            </a:r>
-            <a:r>
-              <a:rPr lang="en-US" sz="1400" dirty="0" err="1"/>
-              <a:t>Towsonbook</a:t>
-            </a:r>
-            <a:r>
-              <a:rPr lang="en-US" sz="1400" dirty="0"/>
-              <a:t> account</a:t>
-            </a:r>
-          </a:p>
-          <a:p>
-            <a:pPr marL="457200" lvl="1" indent="0">
-              <a:buNone/>
-            </a:pPr>
-            <a:r>
-              <a:rPr lang="en-US" sz="1400" dirty="0"/>
-              <a:t>2. </a:t>
-            </a:r>
-            <a:r>
-              <a:rPr lang="en-US" sz="1400" dirty="0" smtClean="0"/>
-              <a:t> </a:t>
-            </a:r>
-            <a:r>
-              <a:rPr lang="en-US" sz="1400" dirty="0"/>
-              <a:t>Enter the friend’s name in the search field in the upper left hand side on the People site</a:t>
-            </a:r>
-          </a:p>
-          <a:p>
-            <a:pPr marL="457200" lvl="1" indent="0">
-              <a:buNone/>
-            </a:pPr>
-            <a:r>
-              <a:rPr lang="en-US" sz="1400" dirty="0" smtClean="0"/>
-              <a:t>3</a:t>
-            </a:r>
-            <a:r>
-              <a:rPr lang="en-US" sz="1400" dirty="0"/>
-              <a:t>. Click the </a:t>
-            </a:r>
-            <a:r>
-              <a:rPr lang="en-US" sz="1400" dirty="0" smtClean="0"/>
-              <a:t>Search Button</a:t>
-            </a:r>
-          </a:p>
-          <a:p>
-            <a:pPr marL="457200" lvl="1" indent="0">
-              <a:buNone/>
-            </a:pPr>
-            <a:r>
-              <a:rPr lang="en-US" sz="1400" dirty="0" smtClean="0"/>
-              <a:t>4</a:t>
-            </a:r>
-            <a:r>
-              <a:rPr lang="en-US" sz="1400" dirty="0"/>
-              <a:t>. The results of the search are displayed in the user’s All People page</a:t>
-            </a:r>
-            <a:r>
-              <a:rPr lang="en-US" sz="1400" dirty="0" smtClean="0"/>
-              <a:t>.</a:t>
-            </a:r>
-            <a:endParaRPr lang="en-US" sz="1400" dirty="0"/>
+              <a:rPr lang="en-US" sz="1200" dirty="0" smtClean="0"/>
+              <a:t>4. </a:t>
+            </a:r>
+            <a:r>
+              <a:rPr lang="en-US" sz="1200" dirty="0"/>
+              <a:t>Click the </a:t>
+            </a:r>
+            <a:r>
+              <a:rPr lang="en-US" sz="1200" dirty="0" smtClean="0"/>
+              <a:t>Button of your choice </a:t>
+            </a:r>
+            <a:r>
+              <a:rPr lang="en-US" sz="1200" dirty="0"/>
+              <a:t>to </a:t>
+            </a:r>
+            <a:r>
+              <a:rPr lang="en-US" sz="1200" dirty="0" smtClean="0"/>
+              <a:t>manage friendship</a:t>
+            </a:r>
+            <a:endParaRPr lang="en-US" sz="1200" dirty="0"/>
+          </a:p>
+          <a:p>
+            <a:endParaRPr lang="en-US" sz="1200" dirty="0" smtClean="0"/>
+          </a:p>
+          <a:p>
+            <a:endParaRPr lang="en-US" sz="1200" dirty="0" smtClean="0"/>
           </a:p>
         </p:txBody>
       </p:sp>
@@ -9575,7 +9800,7 @@
     </p:spTree>
     <p:extLst>
       <p:ext uri="{BB962C8B-B14F-4D97-AF65-F5344CB8AC3E}">
-        <p14:creationId xmlns:p14="http://schemas.microsoft.com/office/powerpoint/2010/main" val="1495357703"/>
+        <p14:creationId xmlns:p14="http://schemas.microsoft.com/office/powerpoint/2010/main" val="639174694"/>
       </p:ext>
     </p:extLst>
   </p:cSld>
@@ -9619,7 +9844,7 @@
           <a:p>
             <a:r>
               <a:rPr lang="en-US" dirty="0" smtClean="0"/>
-              <a:t>Applied Rails Features</a:t>
+              <a:t>User Stories/Use Cases (cont’d) </a:t>
             </a:r>
             <a:endParaRPr lang="en-US" dirty="0"/>
           </a:p>
@@ -9637,61 +9862,185 @@
         </p:nvSpPr>
         <p:spPr>
           <a:xfrm>
-            <a:off x="677334" y="1654355"/>
-            <a:ext cx="8596668" cy="4110962"/>
+            <a:off x="677334" y="1407554"/>
+            <a:ext cx="8596668" cy="5199434"/>
           </a:xfrm>
         </p:spPr>
         <p:txBody>
-          <a:bodyPr/>
-          <a:lstStyle/>
-          <a:p>
-            <a:r>
-              <a:rPr lang="en-US" dirty="0" smtClean="0"/>
-              <a:t>Gems</a:t>
-            </a:r>
-          </a:p>
-          <a:p>
-            <a:pPr lvl="1"/>
-            <a:r>
-              <a:rPr lang="en-US" dirty="0" smtClean="0"/>
-              <a:t>Devise</a:t>
-            </a:r>
-          </a:p>
-          <a:p>
-            <a:pPr lvl="1"/>
-            <a:r>
-              <a:rPr lang="en-US" dirty="0" err="1" smtClean="0"/>
-              <a:t>Carrierwave</a:t>
-            </a:r>
-            <a:endParaRPr lang="en-US" dirty="0" smtClean="0"/>
-          </a:p>
-          <a:p>
-            <a:pPr lvl="1"/>
-            <a:r>
-              <a:rPr lang="en-US" dirty="0" smtClean="0"/>
-              <a:t>Twitter-bootstrap-rails</a:t>
-            </a:r>
-          </a:p>
-          <a:p>
-            <a:pPr lvl="1"/>
-            <a:r>
-              <a:rPr lang="en-US" dirty="0" err="1" smtClean="0"/>
-              <a:t>sdoc</a:t>
-            </a:r>
-            <a:endParaRPr lang="en-US" dirty="0" smtClean="0"/>
-          </a:p>
-          <a:p>
-            <a:r>
-              <a:rPr lang="en-US" dirty="0" smtClean="0"/>
-              <a:t>Session Handling</a:t>
-            </a:r>
-          </a:p>
-          <a:p>
-            <a:r>
-              <a:rPr lang="en-US" dirty="0" smtClean="0"/>
-              <a:t>Form Helpers</a:t>
-            </a:r>
-            <a:endParaRPr lang="en-US" dirty="0"/>
+          <a:bodyPr>
+            <a:noAutofit/>
+          </a:bodyPr>
+          <a:lstStyle/>
+          <a:p>
+            <a:r>
+              <a:rPr lang="en-US" sz="1400" dirty="0" smtClean="0"/>
+              <a:t>Joining Groups</a:t>
+            </a:r>
+          </a:p>
+          <a:p>
+            <a:pPr marL="457200" lvl="1" indent="0">
+              <a:buNone/>
+            </a:pPr>
+            <a:r>
+              <a:rPr lang="en-US" sz="1400" dirty="0"/>
+              <a:t>1. Login to your </a:t>
+            </a:r>
+            <a:r>
+              <a:rPr lang="en-US" sz="1400" dirty="0" err="1"/>
+              <a:t>Towsonbook</a:t>
+            </a:r>
+            <a:r>
+              <a:rPr lang="en-US" sz="1400" dirty="0"/>
+              <a:t> account</a:t>
+            </a:r>
+          </a:p>
+          <a:p>
+            <a:pPr marL="457200" lvl="1" indent="0">
+              <a:buNone/>
+            </a:pPr>
+            <a:r>
+              <a:rPr lang="en-US" sz="1400" dirty="0"/>
+              <a:t>2. Click the </a:t>
+            </a:r>
+            <a:r>
+              <a:rPr lang="en-US" sz="1400" dirty="0" smtClean="0"/>
+              <a:t>Groups Link </a:t>
+            </a:r>
+            <a:r>
+              <a:rPr lang="en-US" sz="1400" dirty="0"/>
+              <a:t>at the top of the page</a:t>
+            </a:r>
+          </a:p>
+          <a:p>
+            <a:pPr marL="457200" lvl="1" indent="0">
+              <a:buNone/>
+            </a:pPr>
+            <a:r>
+              <a:rPr lang="en-US" sz="1400" dirty="0"/>
+              <a:t>3. </a:t>
+            </a:r>
+            <a:r>
+              <a:rPr lang="en-US" sz="1400" dirty="0" smtClean="0"/>
+              <a:t> Manage Groups There (Join Groups or Leave Groups)</a:t>
+            </a:r>
+            <a:endParaRPr lang="en-US" sz="1400" dirty="0"/>
+          </a:p>
+          <a:p>
+            <a:endParaRPr lang="en-US" sz="1400" dirty="0" smtClean="0"/>
+          </a:p>
+          <a:p>
+            <a:r>
+              <a:rPr lang="en-US" sz="1400" dirty="0" smtClean="0"/>
+              <a:t>Writing Wall Posts</a:t>
+            </a:r>
+          </a:p>
+          <a:p>
+            <a:pPr marL="457200" lvl="1" indent="0">
+              <a:buNone/>
+            </a:pPr>
+            <a:r>
+              <a:rPr lang="en-US" sz="1400" dirty="0"/>
+              <a:t>1. Login to your </a:t>
+            </a:r>
+            <a:r>
+              <a:rPr lang="en-US" sz="1400" dirty="0" err="1"/>
+              <a:t>Towsonbook</a:t>
+            </a:r>
+            <a:r>
+              <a:rPr lang="en-US" sz="1400" dirty="0"/>
+              <a:t> account</a:t>
+            </a:r>
+          </a:p>
+          <a:p>
+            <a:pPr marL="457200" lvl="1" indent="0">
+              <a:buNone/>
+            </a:pPr>
+            <a:r>
+              <a:rPr lang="en-US" sz="1400" dirty="0" smtClean="0"/>
+              <a:t>2. Click the </a:t>
+            </a:r>
+          </a:p>
+          <a:p>
+            <a:endParaRPr lang="en-US" sz="1400" dirty="0" smtClean="0"/>
+          </a:p>
+          <a:p>
+            <a:r>
+              <a:rPr lang="en-US" sz="1400" dirty="0" smtClean="0"/>
+              <a:t>Searching for Users</a:t>
+            </a:r>
+          </a:p>
+          <a:p>
+            <a:pPr marL="457200" lvl="1" indent="0">
+              <a:buNone/>
+            </a:pPr>
+            <a:r>
+              <a:rPr lang="en-US" sz="1400" dirty="0" smtClean="0"/>
+              <a:t>1. Login </a:t>
+            </a:r>
+            <a:r>
+              <a:rPr lang="en-US" sz="1400" dirty="0"/>
+              <a:t>to your </a:t>
+            </a:r>
+            <a:r>
+              <a:rPr lang="en-US" sz="1400" dirty="0" err="1"/>
+              <a:t>Towsonbook</a:t>
+            </a:r>
+            <a:r>
+              <a:rPr lang="en-US" sz="1400" dirty="0"/>
+              <a:t> account</a:t>
+            </a:r>
+          </a:p>
+          <a:p>
+            <a:pPr marL="457200" lvl="1" indent="0">
+              <a:buNone/>
+            </a:pPr>
+            <a:r>
+              <a:rPr lang="en-US" sz="1400" dirty="0"/>
+              <a:t>2. </a:t>
+            </a:r>
+            <a:r>
+              <a:rPr lang="en-US" sz="1400" dirty="0" smtClean="0"/>
+              <a:t> </a:t>
+            </a:r>
+            <a:r>
+              <a:rPr lang="en-US" sz="1400" dirty="0"/>
+              <a:t>Enter the friend’s name in the search field in the upper left hand side on the People site</a:t>
+            </a:r>
+          </a:p>
+          <a:p>
+            <a:pPr marL="457200" lvl="1" indent="0">
+              <a:buNone/>
+            </a:pPr>
+            <a:r>
+              <a:rPr lang="en-US" sz="1400" dirty="0" smtClean="0"/>
+              <a:t>3</a:t>
+            </a:r>
+            <a:r>
+              <a:rPr lang="en-US" sz="1400" dirty="0"/>
+              <a:t>. Click the </a:t>
+            </a:r>
+            <a:r>
+              <a:rPr lang="en-US" sz="1400" dirty="0" smtClean="0"/>
+              <a:t>Search Button</a:t>
+            </a:r>
+          </a:p>
+          <a:p>
+            <a:pPr marL="457200" lvl="1" indent="0">
+              <a:buNone/>
+            </a:pPr>
+            <a:r>
+              <a:rPr lang="en-US" sz="1400" dirty="0" smtClean="0"/>
+              <a:t>4</a:t>
+            </a:r>
+            <a:r>
+              <a:rPr lang="en-US" sz="1400" dirty="0"/>
+              <a:t>. The results of the search are displayed in the user’s All People page</a:t>
+            </a:r>
+            <a:r>
+              <a:rPr lang="en-US" sz="1400" dirty="0" smtClean="0"/>
+              <a:t>.</a:t>
+            </a:r>
+            <a:endParaRPr lang="en-US" sz="1400" dirty="0"/>
           </a:p>
         </p:txBody>
       </p:sp>
@@ -9721,7 +10070,7 @@
     </p:spTree>
     <p:extLst>
       <p:ext uri="{BB962C8B-B14F-4D97-AF65-F5344CB8AC3E}">
-        <p14:creationId xmlns:p14="http://schemas.microsoft.com/office/powerpoint/2010/main" val="2432371481"/>
+        <p14:creationId xmlns:p14="http://schemas.microsoft.com/office/powerpoint/2010/main" val="1495357703"/>
       </p:ext>
     </p:extLst>
   </p:cSld>

</xml_diff>